<commit_message>
Add response to major revision 3
</commit_message>
<xml_diff>
--- a/paper/figures/shifts_on_structure/clusters_on_structure.pptx
+++ b/paper/figures/shifts_on_structure/clusters_on_structure.pptx
@@ -288,7 +288,7 @@
           <a:p>
             <a:fld id="{417F159B-2C94-7B4C-848C-EEFC614E552F}" type="datetimeFigureOut">
               <a:rPr lang="en-US" smtClean="0"/>
-              <a:t>2/24/18</a:t>
+              <a:t>2/25/18</a:t>
             </a:fld>
             <a:endParaRPr lang="en-US"/>
           </a:p>
@@ -458,7 +458,7 @@
           <a:p>
             <a:fld id="{417F159B-2C94-7B4C-848C-EEFC614E552F}" type="datetimeFigureOut">
               <a:rPr lang="en-US" smtClean="0"/>
-              <a:t>2/24/18</a:t>
+              <a:t>2/25/18</a:t>
             </a:fld>
             <a:endParaRPr lang="en-US"/>
           </a:p>
@@ -638,7 +638,7 @@
           <a:p>
             <a:fld id="{417F159B-2C94-7B4C-848C-EEFC614E552F}" type="datetimeFigureOut">
               <a:rPr lang="en-US" smtClean="0"/>
-              <a:t>2/24/18</a:t>
+              <a:t>2/25/18</a:t>
             </a:fld>
             <a:endParaRPr lang="en-US"/>
           </a:p>
@@ -808,7 +808,7 @@
           <a:p>
             <a:fld id="{417F159B-2C94-7B4C-848C-EEFC614E552F}" type="datetimeFigureOut">
               <a:rPr lang="en-US" smtClean="0"/>
-              <a:t>2/24/18</a:t>
+              <a:t>2/25/18</a:t>
             </a:fld>
             <a:endParaRPr lang="en-US"/>
           </a:p>
@@ -1054,7 +1054,7 @@
           <a:p>
             <a:fld id="{417F159B-2C94-7B4C-848C-EEFC614E552F}" type="datetimeFigureOut">
               <a:rPr lang="en-US" smtClean="0"/>
-              <a:t>2/24/18</a:t>
+              <a:t>2/25/18</a:t>
             </a:fld>
             <a:endParaRPr lang="en-US"/>
           </a:p>
@@ -1342,7 +1342,7 @@
           <a:p>
             <a:fld id="{417F159B-2C94-7B4C-848C-EEFC614E552F}" type="datetimeFigureOut">
               <a:rPr lang="en-US" smtClean="0"/>
-              <a:t>2/24/18</a:t>
+              <a:t>2/25/18</a:t>
             </a:fld>
             <a:endParaRPr lang="en-US"/>
           </a:p>
@@ -1769,7 +1769,7 @@
           <a:p>
             <a:fld id="{417F159B-2C94-7B4C-848C-EEFC614E552F}" type="datetimeFigureOut">
               <a:rPr lang="en-US" smtClean="0"/>
-              <a:t>2/24/18</a:t>
+              <a:t>2/25/18</a:t>
             </a:fld>
             <a:endParaRPr lang="en-US"/>
           </a:p>
@@ -1887,7 +1887,7 @@
           <a:p>
             <a:fld id="{417F159B-2C94-7B4C-848C-EEFC614E552F}" type="datetimeFigureOut">
               <a:rPr lang="en-US" smtClean="0"/>
-              <a:t>2/24/18</a:t>
+              <a:t>2/25/18</a:t>
             </a:fld>
             <a:endParaRPr lang="en-US"/>
           </a:p>
@@ -1982,7 +1982,7 @@
           <a:p>
             <a:fld id="{417F159B-2C94-7B4C-848C-EEFC614E552F}" type="datetimeFigureOut">
               <a:rPr lang="en-US" smtClean="0"/>
-              <a:t>2/24/18</a:t>
+              <a:t>2/25/18</a:t>
             </a:fld>
             <a:endParaRPr lang="en-US"/>
           </a:p>
@@ -2259,7 +2259,7 @@
           <a:p>
             <a:fld id="{417F159B-2C94-7B4C-848C-EEFC614E552F}" type="datetimeFigureOut">
               <a:rPr lang="en-US" smtClean="0"/>
-              <a:t>2/24/18</a:t>
+              <a:t>2/25/18</a:t>
             </a:fld>
             <a:endParaRPr lang="en-US"/>
           </a:p>
@@ -2512,7 +2512,7 @@
           <a:p>
             <a:fld id="{417F159B-2C94-7B4C-848C-EEFC614E552F}" type="datetimeFigureOut">
               <a:rPr lang="en-US" smtClean="0"/>
-              <a:t>2/24/18</a:t>
+              <a:t>2/25/18</a:t>
             </a:fld>
             <a:endParaRPr lang="en-US"/>
           </a:p>
@@ -2725,7 +2725,7 @@
           <a:p>
             <a:fld id="{417F159B-2C94-7B4C-848C-EEFC614E552F}" type="datetimeFigureOut">
               <a:rPr lang="en-US" smtClean="0"/>
-              <a:t>2/24/18</a:t>
+              <a:t>2/25/18</a:t>
             </a:fld>
             <a:endParaRPr lang="en-US"/>
           </a:p>
@@ -3139,7 +3139,7 @@
         <p:spPr>
           <a:xfrm>
             <a:off x="2564580" y="107296"/>
-            <a:ext cx="2834054" cy="1323439"/>
+            <a:ext cx="2809862" cy="1323439"/>
           </a:xfrm>
           <a:prstGeom prst="rect">
             <a:avLst/>
@@ -3381,7 +3381,7 @@
         </p:nvSpPr>
         <p:spPr>
           <a:xfrm rot="16200000">
-            <a:off x="-442974" y="2534665"/>
+            <a:off x="-442974" y="2479636"/>
             <a:ext cx="1407501" cy="400110"/>
           </a:xfrm>
           <a:prstGeom prst="rect">
@@ -3397,18 +3397,11 @@
           <a:p>
             <a:pPr algn="ctr"/>
             <a:r>
-              <a:rPr lang="en-US" sz="1000" dirty="0" err="1" smtClean="0">
-                <a:latin typeface="Arial"/>
-                <a:cs typeface="Arial"/>
-              </a:rPr>
-              <a:t>Conformationally</a:t>
-            </a:r>
-            <a:r>
               <a:rPr lang="en-US" sz="1000" dirty="0" smtClean="0">
                 <a:latin typeface="Arial"/>
                 <a:cs typeface="Arial"/>
               </a:rPr>
-              <a:t> dynamic region</a:t>
+              <a:t>Sites near the hydrophobic network</a:t>
             </a:r>
             <a:endParaRPr lang="en-US" sz="1000" dirty="0">
               <a:solidFill>
@@ -3458,69 +3451,6 @@
               <a:t> apex</a:t>
             </a:r>
             <a:endParaRPr lang="en-US" sz="1000" dirty="0">
-              <a:latin typeface="Arial"/>
-              <a:cs typeface="Arial"/>
-            </a:endParaRPr>
-          </a:p>
-        </p:txBody>
-      </p:sp>
-      <p:sp>
-        <p:nvSpPr>
-          <p:cNvPr id="11" name="TextBox 10"/>
-          <p:cNvSpPr txBox="1"/>
-          <p:nvPr/>
-        </p:nvSpPr>
-        <p:spPr>
-          <a:xfrm rot="16200000">
-            <a:off x="-296985" y="4446814"/>
-            <a:ext cx="1155637" cy="400110"/>
-          </a:xfrm>
-          <a:prstGeom prst="rect">
-            <a:avLst/>
-          </a:prstGeom>
-          <a:noFill/>
-        </p:spPr>
-        <p:txBody>
-          <a:bodyPr wrap="square" rtlCol="0">
-            <a:spAutoFit/>
-          </a:bodyPr>
-          <a:lstStyle/>
-          <a:p>
-            <a:pPr algn="ctr"/>
-            <a:r>
-              <a:rPr lang="en-US" sz="1000" dirty="0" smtClean="0">
-                <a:solidFill>
-                  <a:srgbClr val="000000"/>
-                </a:solidFill>
-                <a:latin typeface="Arial"/>
-                <a:cs typeface="Arial"/>
-              </a:rPr>
-              <a:t>Inter-</a:t>
-            </a:r>
-            <a:r>
-              <a:rPr lang="en-US" sz="1000" dirty="0" err="1" smtClean="0">
-                <a:solidFill>
-                  <a:srgbClr val="000000"/>
-                </a:solidFill>
-                <a:latin typeface="Arial"/>
-                <a:cs typeface="Arial"/>
-              </a:rPr>
-              <a:t>protomer</a:t>
-            </a:r>
-            <a:r>
-              <a:rPr lang="en-US" sz="1000" dirty="0" smtClean="0">
-                <a:solidFill>
-                  <a:srgbClr val="000000"/>
-                </a:solidFill>
-                <a:latin typeface="Arial"/>
-                <a:cs typeface="Arial"/>
-              </a:rPr>
-              <a:t> helical bundle</a:t>
-            </a:r>
-            <a:endParaRPr lang="en-US" sz="1000" dirty="0">
-              <a:solidFill>
-                <a:srgbClr val="000000"/>
-              </a:solidFill>
               <a:latin typeface="Arial"/>
               <a:cs typeface="Arial"/>
             </a:endParaRPr>
@@ -3600,126 +3530,6 @@
       </p:pic>
       <p:sp>
         <p:nvSpPr>
-          <p:cNvPr id="14" name="TextBox 13"/>
-          <p:cNvSpPr txBox="1"/>
-          <p:nvPr/>
-        </p:nvSpPr>
-        <p:spPr>
-          <a:xfrm>
-            <a:off x="4128661" y="3700690"/>
-            <a:ext cx="1139705" cy="400110"/>
-          </a:xfrm>
-          <a:prstGeom prst="rect">
-            <a:avLst/>
-          </a:prstGeom>
-          <a:noFill/>
-        </p:spPr>
-        <p:txBody>
-          <a:bodyPr wrap="square" rtlCol="0">
-            <a:spAutoFit/>
-          </a:bodyPr>
-          <a:lstStyle/>
-          <a:p>
-            <a:pPr algn="ctr"/>
-            <a:r>
-              <a:rPr lang="en-US" sz="1000" dirty="0" smtClean="0">
-                <a:latin typeface="Arial"/>
-                <a:cs typeface="Arial"/>
-              </a:rPr>
-              <a:t>Post-fusion six-helix bundle</a:t>
-            </a:r>
-            <a:endParaRPr lang="en-US" sz="1000" dirty="0">
-              <a:solidFill>
-                <a:srgbClr val="FFA63B"/>
-              </a:solidFill>
-              <a:latin typeface="Arial"/>
-              <a:cs typeface="Arial"/>
-            </a:endParaRPr>
-          </a:p>
-        </p:txBody>
-      </p:sp>
-      <p:sp>
-        <p:nvSpPr>
-          <p:cNvPr id="15" name="TextBox 14"/>
-          <p:cNvSpPr txBox="1"/>
-          <p:nvPr/>
-        </p:nvSpPr>
-        <p:spPr>
-          <a:xfrm>
-            <a:off x="2328142" y="3700690"/>
-            <a:ext cx="1347139" cy="400110"/>
-          </a:xfrm>
-          <a:prstGeom prst="rect">
-            <a:avLst/>
-          </a:prstGeom>
-          <a:noFill/>
-        </p:spPr>
-        <p:txBody>
-          <a:bodyPr wrap="square" rtlCol="0">
-            <a:spAutoFit/>
-          </a:bodyPr>
-          <a:lstStyle/>
-          <a:p>
-            <a:pPr algn="ctr"/>
-            <a:r>
-              <a:rPr lang="en-US" sz="1000" dirty="0" smtClean="0">
-                <a:latin typeface="Arial"/>
-                <a:cs typeface="Arial"/>
-              </a:rPr>
-              <a:t>Open CD4-bound conformation</a:t>
-            </a:r>
-            <a:endParaRPr lang="en-US" sz="1000" dirty="0">
-              <a:solidFill>
-                <a:srgbClr val="FFA63B"/>
-              </a:solidFill>
-              <a:latin typeface="Arial"/>
-              <a:cs typeface="Arial"/>
-            </a:endParaRPr>
-          </a:p>
-        </p:txBody>
-      </p:sp>
-      <p:sp>
-        <p:nvSpPr>
-          <p:cNvPr id="16" name="TextBox 15"/>
-          <p:cNvSpPr txBox="1"/>
-          <p:nvPr/>
-        </p:nvSpPr>
-        <p:spPr>
-          <a:xfrm>
-            <a:off x="557210" y="3700690"/>
-            <a:ext cx="1347139" cy="400110"/>
-          </a:xfrm>
-          <a:prstGeom prst="rect">
-            <a:avLst/>
-          </a:prstGeom>
-          <a:noFill/>
-        </p:spPr>
-        <p:txBody>
-          <a:bodyPr wrap="square" rtlCol="0">
-            <a:spAutoFit/>
-          </a:bodyPr>
-          <a:lstStyle/>
-          <a:p>
-            <a:pPr algn="ctr"/>
-            <a:r>
-              <a:rPr lang="en-US" sz="1000" dirty="0" smtClean="0">
-                <a:latin typeface="Arial"/>
-                <a:cs typeface="Arial"/>
-              </a:rPr>
-              <a:t>Closed pre-fusion conformation</a:t>
-            </a:r>
-            <a:endParaRPr lang="en-US" sz="1000" dirty="0">
-              <a:solidFill>
-                <a:srgbClr val="FFA63B"/>
-              </a:solidFill>
-              <a:latin typeface="Arial"/>
-              <a:cs typeface="Arial"/>
-            </a:endParaRPr>
-          </a:p>
-        </p:txBody>
-      </p:sp>
-      <p:sp>
-        <p:nvSpPr>
           <p:cNvPr id="17" name="TextBox 16"/>
           <p:cNvSpPr txBox="1"/>
           <p:nvPr/>
@@ -3790,72 +3600,16 @@
           </a:p>
         </p:txBody>
       </p:sp>
-      <p:pic>
-        <p:nvPicPr>
-          <p:cNvPr id="19" name="Picture 18"/>
-          <p:cNvPicPr>
-            <a:picLocks noChangeAspect="1"/>
-          </p:cNvPicPr>
-          <p:nvPr/>
-        </p:nvPicPr>
-        <p:blipFill rotWithShape="1">
-          <a:blip r:embed="rId5"/>
-          <a:srcRect r="20694"/>
-          <a:stretch/>
-        </p:blipFill>
-        <p:spPr>
-          <a:xfrm>
-            <a:off x="467234" y="4075151"/>
-            <a:ext cx="1531447" cy="1131602"/>
-          </a:xfrm>
-          <a:prstGeom prst="rect">
-            <a:avLst/>
-          </a:prstGeom>
-          <a:ln>
-            <a:solidFill>
-              <a:srgbClr val="7F7F7F"/>
-            </a:solidFill>
-          </a:ln>
-        </p:spPr>
-      </p:pic>
-      <p:pic>
-        <p:nvPicPr>
-          <p:cNvPr id="20" name="Picture 19"/>
-          <p:cNvPicPr>
-            <a:picLocks noChangeAspect="1"/>
-          </p:cNvPicPr>
-          <p:nvPr/>
-        </p:nvPicPr>
-        <p:blipFill rotWithShape="1">
-          <a:blip r:embed="rId6"/>
-          <a:srcRect r="23012"/>
-          <a:stretch/>
-        </p:blipFill>
-        <p:spPr>
-          <a:xfrm>
-            <a:off x="2239084" y="4075152"/>
-            <a:ext cx="1531447" cy="1131851"/>
-          </a:xfrm>
-          <a:prstGeom prst="rect">
-            <a:avLst/>
-          </a:prstGeom>
-          <a:ln>
-            <a:solidFill>
-              <a:srgbClr val="7F7F7F"/>
-            </a:solidFill>
-          </a:ln>
-        </p:spPr>
-      </p:pic>
-      <p:sp>
-        <p:nvSpPr>
-          <p:cNvPr id="21" name="TextBox 20"/>
+      <p:sp>
+        <p:nvSpPr>
+          <p:cNvPr id="36" name="TextBox 35"/>
           <p:cNvSpPr txBox="1"/>
           <p:nvPr/>
         </p:nvSpPr>
         <p:spPr>
           <a:xfrm>
-            <a:off x="11934" y="3756880"/>
-            <a:ext cx="455298" cy="400110"/>
+            <a:off x="797548" y="311181"/>
+            <a:ext cx="406946" cy="246221"/>
           </a:xfrm>
           <a:prstGeom prst="rect">
             <a:avLst/>
@@ -3863,70 +3617,42 @@
           <a:noFill/>
         </p:spPr>
         <p:txBody>
-          <a:bodyPr wrap="none" rtlCol="0">
+          <a:bodyPr wrap="square" rtlCol="0">
             <a:spAutoFit/>
           </a:bodyPr>
           <a:lstStyle/>
           <a:p>
-            <a:r>
-              <a:rPr lang="en-US" sz="2000" b="1" dirty="0">
+            <a:pPr algn="ctr"/>
+            <a:r>
+              <a:rPr lang="en-US" sz="1000" b="1" dirty="0" smtClean="0">
+                <a:solidFill>
+                  <a:srgbClr val="FF6600"/>
+                </a:solidFill>
                 <a:latin typeface="Arial"/>
                 <a:cs typeface="Arial"/>
               </a:rPr>
-              <a:t>C</a:t>
-            </a:r>
-            <a:r>
-              <a:rPr lang="en-US" sz="2000" b="1" dirty="0" smtClean="0">
-                <a:latin typeface="Arial"/>
-                <a:cs typeface="Arial"/>
-              </a:rPr>
-              <a:t>)</a:t>
-            </a:r>
-            <a:endParaRPr lang="en-US" sz="2000" b="1" dirty="0">
+              <a:t>165</a:t>
+            </a:r>
+            <a:endParaRPr lang="en-US" sz="1000" b="1" dirty="0">
+              <a:solidFill>
+                <a:srgbClr val="FF6600"/>
+              </a:solidFill>
               <a:latin typeface="Arial"/>
               <a:cs typeface="Arial"/>
             </a:endParaRPr>
           </a:p>
         </p:txBody>
       </p:sp>
-      <p:pic>
-        <p:nvPicPr>
-          <p:cNvPr id="22" name="Picture 21"/>
-          <p:cNvPicPr>
-            <a:picLocks noChangeAspect="1"/>
-          </p:cNvPicPr>
-          <p:nvPr/>
-        </p:nvPicPr>
-        <p:blipFill rotWithShape="1">
-          <a:blip r:embed="rId7"/>
-          <a:srcRect l="1" r="27479"/>
-          <a:stretch/>
-        </p:blipFill>
-        <p:spPr>
-          <a:xfrm>
-            <a:off x="3999127" y="4075400"/>
-            <a:ext cx="1384168" cy="1131850"/>
-          </a:xfrm>
-          <a:prstGeom prst="rect">
-            <a:avLst/>
-          </a:prstGeom>
-          <a:ln>
-            <a:solidFill>
-              <a:srgbClr val="7F7F7F"/>
-            </a:solidFill>
-          </a:ln>
-        </p:spPr>
-      </p:pic>
-      <p:sp>
-        <p:nvSpPr>
-          <p:cNvPr id="23" name="TextBox 22"/>
+      <p:sp>
+        <p:nvSpPr>
+          <p:cNvPr id="37" name="TextBox 36"/>
           <p:cNvSpPr txBox="1"/>
           <p:nvPr/>
         </p:nvSpPr>
         <p:spPr>
           <a:xfrm>
-            <a:off x="1204494" y="4223357"/>
-            <a:ext cx="438583" cy="246221"/>
+            <a:off x="931063" y="615274"/>
+            <a:ext cx="406946" cy="246221"/>
           </a:xfrm>
           <a:prstGeom prst="rect">
             <a:avLst/>
@@ -3943,12 +3669,270 @@
             <a:r>
               <a:rPr lang="en-US" sz="1000" b="1" dirty="0" smtClean="0">
                 <a:solidFill>
-                  <a:srgbClr val="FF0000"/>
+                  <a:srgbClr val="FF6600"/>
                 </a:solidFill>
                 <a:latin typeface="Arial"/>
                 <a:cs typeface="Arial"/>
               </a:rPr>
-              <a:t>583</a:t>
+              <a:t>164</a:t>
+            </a:r>
+            <a:endParaRPr lang="en-US" sz="1000" b="1" dirty="0">
+              <a:solidFill>
+                <a:srgbClr val="FF6600"/>
+              </a:solidFill>
+              <a:latin typeface="Arial"/>
+              <a:cs typeface="Arial"/>
+            </a:endParaRPr>
+          </a:p>
+        </p:txBody>
+      </p:sp>
+      <p:sp>
+        <p:nvSpPr>
+          <p:cNvPr id="38" name="TextBox 37"/>
+          <p:cNvSpPr txBox="1"/>
+          <p:nvPr/>
+        </p:nvSpPr>
+        <p:spPr>
+          <a:xfrm>
+            <a:off x="1544538" y="907718"/>
+            <a:ext cx="406946" cy="246221"/>
+          </a:xfrm>
+          <a:prstGeom prst="rect">
+            <a:avLst/>
+          </a:prstGeom>
+          <a:noFill/>
+        </p:spPr>
+        <p:txBody>
+          <a:bodyPr wrap="square" rtlCol="0">
+            <a:spAutoFit/>
+          </a:bodyPr>
+          <a:lstStyle/>
+          <a:p>
+            <a:pPr algn="ctr"/>
+            <a:r>
+              <a:rPr lang="en-US" sz="1000" b="1" dirty="0" smtClean="0">
+                <a:solidFill>
+                  <a:srgbClr val="FF6600"/>
+                </a:solidFill>
+                <a:latin typeface="Arial"/>
+                <a:cs typeface="Arial"/>
+              </a:rPr>
+              <a:t>307</a:t>
+            </a:r>
+            <a:endParaRPr lang="en-US" sz="1000" b="1" dirty="0">
+              <a:solidFill>
+                <a:srgbClr val="FF6600"/>
+              </a:solidFill>
+              <a:latin typeface="Arial"/>
+              <a:cs typeface="Arial"/>
+            </a:endParaRPr>
+          </a:p>
+        </p:txBody>
+      </p:sp>
+      <p:sp>
+        <p:nvSpPr>
+          <p:cNvPr id="40" name="TextBox 39"/>
+          <p:cNvSpPr txBox="1"/>
+          <p:nvPr/>
+        </p:nvSpPr>
+        <p:spPr>
+          <a:xfrm>
+            <a:off x="797548" y="1142179"/>
+            <a:ext cx="460535" cy="246221"/>
+          </a:xfrm>
+          <a:prstGeom prst="rect">
+            <a:avLst/>
+          </a:prstGeom>
+          <a:noFill/>
+        </p:spPr>
+        <p:txBody>
+          <a:bodyPr wrap="square" rtlCol="0">
+            <a:spAutoFit/>
+          </a:bodyPr>
+          <a:lstStyle/>
+          <a:p>
+            <a:pPr algn="ctr"/>
+            <a:r>
+              <a:rPr lang="en-US" sz="1000" b="1" dirty="0" smtClean="0">
+                <a:solidFill>
+                  <a:srgbClr val="D99449"/>
+                </a:solidFill>
+                <a:latin typeface="Arial"/>
+                <a:cs typeface="Arial"/>
+              </a:rPr>
+              <a:t>308</a:t>
+            </a:r>
+            <a:endParaRPr lang="en-US" sz="1000" b="1" dirty="0">
+              <a:solidFill>
+                <a:srgbClr val="D99449"/>
+              </a:solidFill>
+              <a:latin typeface="Arial"/>
+              <a:cs typeface="Arial"/>
+            </a:endParaRPr>
+          </a:p>
+        </p:txBody>
+      </p:sp>
+      <p:sp>
+        <p:nvSpPr>
+          <p:cNvPr id="41" name="TextBox 40"/>
+          <p:cNvSpPr txBox="1"/>
+          <p:nvPr/>
+        </p:nvSpPr>
+        <p:spPr>
+          <a:xfrm>
+            <a:off x="1179093" y="492163"/>
+            <a:ext cx="460535" cy="246221"/>
+          </a:xfrm>
+          <a:prstGeom prst="rect">
+            <a:avLst/>
+          </a:prstGeom>
+          <a:noFill/>
+        </p:spPr>
+        <p:txBody>
+          <a:bodyPr wrap="square" rtlCol="0">
+            <a:spAutoFit/>
+          </a:bodyPr>
+          <a:lstStyle/>
+          <a:p>
+            <a:pPr algn="ctr"/>
+            <a:r>
+              <a:rPr lang="en-US" sz="1000" b="1" dirty="0" smtClean="0">
+                <a:solidFill>
+                  <a:srgbClr val="D99449"/>
+                </a:solidFill>
+                <a:latin typeface="Arial"/>
+                <a:cs typeface="Arial"/>
+              </a:rPr>
+              <a:t>161</a:t>
+            </a:r>
+            <a:endParaRPr lang="en-US" sz="1000" b="1" dirty="0">
+              <a:solidFill>
+                <a:srgbClr val="D99449"/>
+              </a:solidFill>
+              <a:latin typeface="Arial"/>
+              <a:cs typeface="Arial"/>
+            </a:endParaRPr>
+          </a:p>
+        </p:txBody>
+      </p:sp>
+      <p:sp>
+        <p:nvSpPr>
+          <p:cNvPr id="42" name="TextBox 41"/>
+          <p:cNvSpPr txBox="1"/>
+          <p:nvPr/>
+        </p:nvSpPr>
+        <p:spPr>
+          <a:xfrm>
+            <a:off x="4426207" y="3192250"/>
+            <a:ext cx="460535" cy="246221"/>
+          </a:xfrm>
+          <a:prstGeom prst="rect">
+            <a:avLst/>
+          </a:prstGeom>
+          <a:noFill/>
+        </p:spPr>
+        <p:txBody>
+          <a:bodyPr wrap="square" rtlCol="0">
+            <a:spAutoFit/>
+          </a:bodyPr>
+          <a:lstStyle/>
+          <a:p>
+            <a:pPr algn="ctr"/>
+            <a:r>
+              <a:rPr lang="en-US" sz="1000" b="1" dirty="0" smtClean="0">
+                <a:solidFill>
+                  <a:srgbClr val="660066"/>
+                </a:solidFill>
+                <a:latin typeface="Arial"/>
+                <a:cs typeface="Arial"/>
+              </a:rPr>
+              <a:t>69</a:t>
+            </a:r>
+            <a:endParaRPr lang="en-US" sz="1000" b="1" dirty="0">
+              <a:solidFill>
+                <a:srgbClr val="660066"/>
+              </a:solidFill>
+              <a:latin typeface="Arial"/>
+              <a:cs typeface="Arial"/>
+            </a:endParaRPr>
+          </a:p>
+        </p:txBody>
+      </p:sp>
+      <p:sp>
+        <p:nvSpPr>
+          <p:cNvPr id="43" name="TextBox 42"/>
+          <p:cNvSpPr txBox="1"/>
+          <p:nvPr/>
+        </p:nvSpPr>
+        <p:spPr>
+          <a:xfrm>
+            <a:off x="1691906" y="2574184"/>
+            <a:ext cx="460535" cy="246221"/>
+          </a:xfrm>
+          <a:prstGeom prst="rect">
+            <a:avLst/>
+          </a:prstGeom>
+          <a:noFill/>
+        </p:spPr>
+        <p:txBody>
+          <a:bodyPr wrap="square" rtlCol="0">
+            <a:spAutoFit/>
+          </a:bodyPr>
+          <a:lstStyle/>
+          <a:p>
+            <a:pPr algn="ctr"/>
+            <a:r>
+              <a:rPr lang="en-US" sz="1000" b="1" dirty="0" smtClean="0">
+                <a:solidFill>
+                  <a:srgbClr val="660066"/>
+                </a:solidFill>
+                <a:latin typeface="Arial"/>
+                <a:cs typeface="Arial"/>
+              </a:rPr>
+              <a:t>69</a:t>
+            </a:r>
+            <a:endParaRPr lang="en-US" sz="1000" b="1" dirty="0">
+              <a:solidFill>
+                <a:srgbClr val="660066"/>
+              </a:solidFill>
+              <a:latin typeface="Arial"/>
+              <a:cs typeface="Arial"/>
+            </a:endParaRPr>
+          </a:p>
+        </p:txBody>
+      </p:sp>
+      <p:sp>
+        <p:nvSpPr>
+          <p:cNvPr id="44" name="TextBox 43"/>
+          <p:cNvSpPr txBox="1"/>
+          <p:nvPr/>
+        </p:nvSpPr>
+        <p:spPr>
+          <a:xfrm>
+            <a:off x="2581514" y="2004759"/>
+            <a:ext cx="460535" cy="246221"/>
+          </a:xfrm>
+          <a:prstGeom prst="rect">
+            <a:avLst/>
+          </a:prstGeom>
+          <a:noFill/>
+        </p:spPr>
+        <p:txBody>
+          <a:bodyPr wrap="square" rtlCol="0">
+            <a:spAutoFit/>
+          </a:bodyPr>
+          <a:lstStyle/>
+          <a:p>
+            <a:pPr algn="ctr"/>
+            <a:r>
+              <a:rPr lang="en-US" sz="1000" b="1" dirty="0" smtClean="0">
+                <a:solidFill>
+                  <a:srgbClr val="FF0000"/>
+                </a:solidFill>
+                <a:latin typeface="Arial"/>
+                <a:cs typeface="Arial"/>
+              </a:rPr>
+              <a:t>64</a:t>
             </a:r>
             <a:endParaRPr lang="en-US" sz="1000" b="1" dirty="0">
               <a:solidFill>
@@ -3962,14 +3946,14 @@
       </p:sp>
       <p:sp>
         <p:nvSpPr>
-          <p:cNvPr id="24" name="TextBox 23"/>
+          <p:cNvPr id="45" name="TextBox 44"/>
           <p:cNvSpPr txBox="1"/>
           <p:nvPr/>
         </p:nvSpPr>
         <p:spPr>
           <a:xfrm>
-            <a:off x="1100668" y="4765634"/>
-            <a:ext cx="434025" cy="246221"/>
+            <a:off x="4382186" y="2169520"/>
+            <a:ext cx="460535" cy="246221"/>
           </a:xfrm>
           <a:prstGeom prst="rect">
             <a:avLst/>
@@ -3991,7 +3975,7 @@
                 <a:latin typeface="Arial"/>
                 <a:cs typeface="Arial"/>
               </a:rPr>
-              <a:t>587</a:t>
+              <a:t>64</a:t>
             </a:r>
             <a:endParaRPr lang="en-US" sz="1000" b="1" dirty="0">
               <a:solidFill>
@@ -4005,14 +3989,14 @@
       </p:sp>
       <p:sp>
         <p:nvSpPr>
-          <p:cNvPr id="25" name="TextBox 24"/>
+          <p:cNvPr id="46" name="TextBox 45"/>
           <p:cNvSpPr txBox="1"/>
           <p:nvPr/>
         </p:nvSpPr>
         <p:spPr>
           <a:xfrm>
-            <a:off x="1591735" y="4257225"/>
-            <a:ext cx="406946" cy="246221"/>
+            <a:off x="617247" y="1855561"/>
+            <a:ext cx="460535" cy="246221"/>
           </a:xfrm>
           <a:prstGeom prst="rect">
             <a:avLst/>
@@ -4029,12 +4013,270 @@
             <a:r>
               <a:rPr lang="en-US" sz="1000" b="1" dirty="0" smtClean="0">
                 <a:solidFill>
-                  <a:srgbClr val="FF0000"/>
+                  <a:srgbClr val="0000FF"/>
                 </a:solidFill>
                 <a:latin typeface="Arial"/>
                 <a:cs typeface="Arial"/>
               </a:rPr>
-              <a:t>582</a:t>
+              <a:t>435</a:t>
+            </a:r>
+            <a:endParaRPr lang="en-US" sz="1000" b="1" dirty="0">
+              <a:solidFill>
+                <a:srgbClr val="0000FF"/>
+              </a:solidFill>
+              <a:latin typeface="Arial"/>
+              <a:cs typeface="Arial"/>
+            </a:endParaRPr>
+          </a:p>
+        </p:txBody>
+      </p:sp>
+      <p:sp>
+        <p:nvSpPr>
+          <p:cNvPr id="47" name="TextBox 46"/>
+          <p:cNvSpPr txBox="1"/>
+          <p:nvPr/>
+        </p:nvSpPr>
+        <p:spPr>
+          <a:xfrm>
+            <a:off x="3577526" y="2165282"/>
+            <a:ext cx="460535" cy="246221"/>
+          </a:xfrm>
+          <a:prstGeom prst="rect">
+            <a:avLst/>
+          </a:prstGeom>
+          <a:noFill/>
+        </p:spPr>
+        <p:txBody>
+          <a:bodyPr wrap="square" rtlCol="0">
+            <a:spAutoFit/>
+          </a:bodyPr>
+          <a:lstStyle/>
+          <a:p>
+            <a:pPr algn="ctr"/>
+            <a:r>
+              <a:rPr lang="en-US" sz="1000" b="1" dirty="0" smtClean="0">
+                <a:solidFill>
+                  <a:srgbClr val="0000FF"/>
+                </a:solidFill>
+                <a:latin typeface="Arial"/>
+                <a:cs typeface="Arial"/>
+              </a:rPr>
+              <a:t>435</a:t>
+            </a:r>
+            <a:endParaRPr lang="en-US" sz="1000" b="1" dirty="0">
+              <a:solidFill>
+                <a:srgbClr val="0000FF"/>
+              </a:solidFill>
+              <a:latin typeface="Arial"/>
+              <a:cs typeface="Arial"/>
+            </a:endParaRPr>
+          </a:p>
+        </p:txBody>
+      </p:sp>
+      <p:sp>
+        <p:nvSpPr>
+          <p:cNvPr id="48" name="TextBox 47"/>
+          <p:cNvSpPr txBox="1"/>
+          <p:nvPr/>
+        </p:nvSpPr>
+        <p:spPr>
+          <a:xfrm>
+            <a:off x="903943" y="2464114"/>
+            <a:ext cx="406946" cy="246221"/>
+          </a:xfrm>
+          <a:prstGeom prst="rect">
+            <a:avLst/>
+          </a:prstGeom>
+          <a:noFill/>
+        </p:spPr>
+        <p:txBody>
+          <a:bodyPr wrap="square" rtlCol="0">
+            <a:spAutoFit/>
+          </a:bodyPr>
+          <a:lstStyle/>
+          <a:p>
+            <a:pPr algn="ctr"/>
+            <a:r>
+              <a:rPr lang="en-US" sz="1000" b="1" dirty="0" smtClean="0">
+                <a:solidFill>
+                  <a:srgbClr val="FF6600"/>
+                </a:solidFill>
+                <a:latin typeface="Arial"/>
+                <a:cs typeface="Arial"/>
+              </a:rPr>
+              <a:t>434</a:t>
+            </a:r>
+            <a:endParaRPr lang="en-US" sz="1000" b="1" dirty="0">
+              <a:solidFill>
+                <a:srgbClr val="FF6600"/>
+              </a:solidFill>
+              <a:latin typeface="Arial"/>
+              <a:cs typeface="Arial"/>
+            </a:endParaRPr>
+          </a:p>
+        </p:txBody>
+      </p:sp>
+      <p:sp>
+        <p:nvSpPr>
+          <p:cNvPr id="49" name="TextBox 48"/>
+          <p:cNvSpPr txBox="1"/>
+          <p:nvPr/>
+        </p:nvSpPr>
+        <p:spPr>
+          <a:xfrm>
+            <a:off x="2999239" y="2013910"/>
+            <a:ext cx="406946" cy="246221"/>
+          </a:xfrm>
+          <a:prstGeom prst="rect">
+            <a:avLst/>
+          </a:prstGeom>
+          <a:noFill/>
+        </p:spPr>
+        <p:txBody>
+          <a:bodyPr wrap="square" rtlCol="0">
+            <a:spAutoFit/>
+          </a:bodyPr>
+          <a:lstStyle/>
+          <a:p>
+            <a:pPr algn="ctr"/>
+            <a:r>
+              <a:rPr lang="en-US" sz="1000" b="1" dirty="0" smtClean="0">
+                <a:solidFill>
+                  <a:srgbClr val="FF6600"/>
+                </a:solidFill>
+                <a:latin typeface="Arial"/>
+                <a:cs typeface="Arial"/>
+              </a:rPr>
+              <a:t>434</a:t>
+            </a:r>
+            <a:endParaRPr lang="en-US" sz="1000" b="1" dirty="0">
+              <a:solidFill>
+                <a:srgbClr val="FF6600"/>
+              </a:solidFill>
+              <a:latin typeface="Arial"/>
+              <a:cs typeface="Arial"/>
+            </a:endParaRPr>
+          </a:p>
+        </p:txBody>
+      </p:sp>
+      <p:sp>
+        <p:nvSpPr>
+          <p:cNvPr id="50" name="TextBox 49"/>
+          <p:cNvSpPr txBox="1"/>
+          <p:nvPr/>
+        </p:nvSpPr>
+        <p:spPr>
+          <a:xfrm>
+            <a:off x="5050607" y="2895111"/>
+            <a:ext cx="460535" cy="246221"/>
+          </a:xfrm>
+          <a:prstGeom prst="rect">
+            <a:avLst/>
+          </a:prstGeom>
+          <a:noFill/>
+        </p:spPr>
+        <p:txBody>
+          <a:bodyPr wrap="square" rtlCol="0">
+            <a:spAutoFit/>
+          </a:bodyPr>
+          <a:lstStyle/>
+          <a:p>
+            <a:pPr algn="ctr"/>
+            <a:r>
+              <a:rPr lang="en-US" sz="1000" b="1" dirty="0" smtClean="0">
+                <a:solidFill>
+                  <a:srgbClr val="0000FF"/>
+                </a:solidFill>
+                <a:latin typeface="Arial"/>
+                <a:cs typeface="Arial"/>
+              </a:rPr>
+              <a:t>72</a:t>
+            </a:r>
+            <a:endParaRPr lang="en-US" sz="1000" b="1" dirty="0">
+              <a:solidFill>
+                <a:srgbClr val="0000FF"/>
+              </a:solidFill>
+              <a:latin typeface="Arial"/>
+              <a:cs typeface="Arial"/>
+            </a:endParaRPr>
+          </a:p>
+        </p:txBody>
+      </p:sp>
+      <p:sp>
+        <p:nvSpPr>
+          <p:cNvPr id="51" name="TextBox 50"/>
+          <p:cNvSpPr txBox="1"/>
+          <p:nvPr/>
+        </p:nvSpPr>
+        <p:spPr>
+          <a:xfrm>
+            <a:off x="2153333" y="2615221"/>
+            <a:ext cx="460535" cy="246221"/>
+          </a:xfrm>
+          <a:prstGeom prst="rect">
+            <a:avLst/>
+          </a:prstGeom>
+          <a:noFill/>
+        </p:spPr>
+        <p:txBody>
+          <a:bodyPr wrap="square" rtlCol="0">
+            <a:spAutoFit/>
+          </a:bodyPr>
+          <a:lstStyle/>
+          <a:p>
+            <a:pPr algn="ctr"/>
+            <a:r>
+              <a:rPr lang="en-US" sz="1000" b="1" dirty="0" smtClean="0">
+                <a:solidFill>
+                  <a:srgbClr val="0000FF"/>
+                </a:solidFill>
+                <a:latin typeface="Arial"/>
+                <a:cs typeface="Arial"/>
+              </a:rPr>
+              <a:t>72</a:t>
+            </a:r>
+            <a:endParaRPr lang="en-US" sz="1000" b="1" dirty="0">
+              <a:solidFill>
+                <a:srgbClr val="0000FF"/>
+              </a:solidFill>
+              <a:latin typeface="Arial"/>
+              <a:cs typeface="Arial"/>
+            </a:endParaRPr>
+          </a:p>
+        </p:txBody>
+      </p:sp>
+      <p:sp>
+        <p:nvSpPr>
+          <p:cNvPr id="52" name="TextBox 51"/>
+          <p:cNvSpPr txBox="1"/>
+          <p:nvPr/>
+        </p:nvSpPr>
+        <p:spPr>
+          <a:xfrm>
+            <a:off x="1021465" y="2168362"/>
+            <a:ext cx="460535" cy="246221"/>
+          </a:xfrm>
+          <a:prstGeom prst="rect">
+            <a:avLst/>
+          </a:prstGeom>
+          <a:noFill/>
+        </p:spPr>
+        <p:txBody>
+          <a:bodyPr wrap="square" rtlCol="0">
+            <a:spAutoFit/>
+          </a:bodyPr>
+          <a:lstStyle/>
+          <a:p>
+            <a:pPr algn="ctr"/>
+            <a:r>
+              <a:rPr lang="en-US" sz="1000" b="1" dirty="0" smtClean="0">
+                <a:solidFill>
+                  <a:srgbClr val="FF0000"/>
+                </a:solidFill>
+                <a:latin typeface="Arial"/>
+                <a:cs typeface="Arial"/>
+              </a:rPr>
+              <a:t>436</a:t>
             </a:r>
             <a:endParaRPr lang="en-US" sz="1000" b="1" dirty="0">
               <a:solidFill>
@@ -4048,13 +4290,13 @@
       </p:sp>
       <p:sp>
         <p:nvSpPr>
-          <p:cNvPr id="26" name="TextBox 25"/>
+          <p:cNvPr id="53" name="TextBox 52"/>
           <p:cNvSpPr txBox="1"/>
           <p:nvPr/>
         </p:nvSpPr>
         <p:spPr>
           <a:xfrm>
-            <a:off x="1660011" y="4735660"/>
+            <a:off x="3310776" y="1951065"/>
             <a:ext cx="460535" cy="246221"/>
           </a:xfrm>
           <a:prstGeom prst="rect">
@@ -4072,55 +4314,12 @@
             <a:r>
               <a:rPr lang="en-US" sz="1000" b="1" dirty="0" smtClean="0">
                 <a:solidFill>
-                  <a:srgbClr val="D99449"/>
+                  <a:srgbClr val="FF0000"/>
                 </a:solidFill>
                 <a:latin typeface="Arial"/>
                 <a:cs typeface="Arial"/>
               </a:rPr>
-              <a:t>588</a:t>
-            </a:r>
-            <a:endParaRPr lang="en-US" sz="1000" b="1" dirty="0">
-              <a:solidFill>
-                <a:srgbClr val="D99449"/>
-              </a:solidFill>
-              <a:latin typeface="Arial"/>
-              <a:cs typeface="Arial"/>
-            </a:endParaRPr>
-          </a:p>
-        </p:txBody>
-      </p:sp>
-      <p:sp>
-        <p:nvSpPr>
-          <p:cNvPr id="27" name="TextBox 26"/>
-          <p:cNvSpPr txBox="1"/>
-          <p:nvPr/>
-        </p:nvSpPr>
-        <p:spPr>
-          <a:xfrm>
-            <a:off x="2942476" y="4235712"/>
-            <a:ext cx="438583" cy="246221"/>
-          </a:xfrm>
-          <a:prstGeom prst="rect">
-            <a:avLst/>
-          </a:prstGeom>
-          <a:noFill/>
-        </p:spPr>
-        <p:txBody>
-          <a:bodyPr wrap="square" rtlCol="0">
-            <a:spAutoFit/>
-          </a:bodyPr>
-          <a:lstStyle/>
-          <a:p>
-            <a:pPr algn="ctr"/>
-            <a:r>
-              <a:rPr lang="en-US" sz="1000" b="1" dirty="0" smtClean="0">
-                <a:solidFill>
-                  <a:srgbClr val="FF0000"/>
-                </a:solidFill>
-                <a:latin typeface="Arial"/>
-                <a:cs typeface="Arial"/>
-              </a:rPr>
-              <a:t>583</a:t>
+              <a:t>436</a:t>
             </a:r>
             <a:endParaRPr lang="en-US" sz="1000" b="1" dirty="0">
               <a:solidFill>
@@ -4134,14 +4333,14 @@
       </p:sp>
       <p:sp>
         <p:nvSpPr>
-          <p:cNvPr id="28" name="TextBox 27"/>
+          <p:cNvPr id="54" name="TextBox 53"/>
           <p:cNvSpPr txBox="1"/>
           <p:nvPr/>
         </p:nvSpPr>
         <p:spPr>
           <a:xfrm>
-            <a:off x="2864051" y="4794923"/>
-            <a:ext cx="434025" cy="246221"/>
+            <a:off x="1266217" y="1872404"/>
+            <a:ext cx="460535" cy="246221"/>
           </a:xfrm>
           <a:prstGeom prst="rect">
             <a:avLst/>
@@ -4163,7 +4362,7 @@
                 <a:latin typeface="Arial"/>
                 <a:cs typeface="Arial"/>
               </a:rPr>
-              <a:t>587</a:t>
+              <a:t>381</a:t>
             </a:r>
             <a:endParaRPr lang="en-US" sz="1000" b="1" dirty="0">
               <a:solidFill>
@@ -4177,14 +4376,14 @@
       </p:sp>
       <p:sp>
         <p:nvSpPr>
-          <p:cNvPr id="29" name="TextBox 28"/>
+          <p:cNvPr id="55" name="TextBox 54"/>
           <p:cNvSpPr txBox="1"/>
           <p:nvPr/>
         </p:nvSpPr>
         <p:spPr>
           <a:xfrm>
-            <a:off x="3329717" y="4413519"/>
-            <a:ext cx="406946" cy="246221"/>
+            <a:off x="3902172" y="1789854"/>
+            <a:ext cx="460535" cy="246221"/>
           </a:xfrm>
           <a:prstGeom prst="rect">
             <a:avLst/>
@@ -4206,7 +4405,7 @@
                 <a:latin typeface="Arial"/>
                 <a:cs typeface="Arial"/>
               </a:rPr>
-              <a:t>582</a:t>
+              <a:t>381</a:t>
             </a:r>
             <a:endParaRPr lang="en-US" sz="1000" b="1" dirty="0">
               <a:solidFill>
@@ -4220,13 +4419,13 @@
       </p:sp>
       <p:sp>
         <p:nvSpPr>
-          <p:cNvPr id="30" name="TextBox 29"/>
+          <p:cNvPr id="56" name="TextBox 55"/>
           <p:cNvSpPr txBox="1"/>
           <p:nvPr/>
         </p:nvSpPr>
         <p:spPr>
           <a:xfrm>
-            <a:off x="3106407" y="5010756"/>
+            <a:off x="3245767" y="1698493"/>
             <a:ext cx="460535" cy="246221"/>
           </a:xfrm>
           <a:prstGeom prst="rect">
@@ -4244,16 +4443,16 @@
             <a:r>
               <a:rPr lang="en-US" sz="1000" b="1" dirty="0" smtClean="0">
                 <a:solidFill>
-                  <a:srgbClr val="D99449"/>
+                  <a:srgbClr val="FF0000"/>
                 </a:solidFill>
                 <a:latin typeface="Arial"/>
                 <a:cs typeface="Arial"/>
               </a:rPr>
-              <a:t>588</a:t>
+              <a:t>420</a:t>
             </a:r>
             <a:endParaRPr lang="en-US" sz="1000" b="1" dirty="0">
               <a:solidFill>
-                <a:srgbClr val="D99449"/>
+                <a:srgbClr val="FF0000"/>
               </a:solidFill>
               <a:latin typeface="Arial"/>
               <a:cs typeface="Arial"/>
@@ -4263,14 +4462,14 @@
       </p:sp>
       <p:sp>
         <p:nvSpPr>
-          <p:cNvPr id="31" name="TextBox 30"/>
+          <p:cNvPr id="57" name="TextBox 56"/>
           <p:cNvSpPr txBox="1"/>
           <p:nvPr/>
         </p:nvSpPr>
         <p:spPr>
-          <a:xfrm>
-            <a:off x="3329711" y="4151036"/>
-            <a:ext cx="406946" cy="246221"/>
+          <a:xfrm rot="16200000">
+            <a:off x="991499" y="1767243"/>
+            <a:ext cx="460535" cy="246221"/>
           </a:xfrm>
           <a:prstGeom prst="rect">
             <a:avLst/>
@@ -4287,12 +4486,313 @@
             <a:r>
               <a:rPr lang="en-US" sz="1000" b="1" dirty="0" smtClean="0">
                 <a:solidFill>
-                  <a:srgbClr val="FF6600"/>
+                  <a:srgbClr val="FF0000"/>
                 </a:solidFill>
                 <a:latin typeface="Arial"/>
                 <a:cs typeface="Arial"/>
               </a:rPr>
-              <a:t>520</a:t>
+              <a:t>420</a:t>
+            </a:r>
+            <a:endParaRPr lang="en-US" sz="1000" b="1" dirty="0">
+              <a:solidFill>
+                <a:srgbClr val="FF0000"/>
+              </a:solidFill>
+              <a:latin typeface="Arial"/>
+              <a:cs typeface="Arial"/>
+            </a:endParaRPr>
+          </a:p>
+        </p:txBody>
+      </p:sp>
+      <p:sp>
+        <p:nvSpPr>
+          <p:cNvPr id="58" name="TextBox 57"/>
+          <p:cNvSpPr txBox="1"/>
+          <p:nvPr/>
+        </p:nvSpPr>
+        <p:spPr>
+          <a:xfrm>
+            <a:off x="1023915" y="3062789"/>
+            <a:ext cx="460535" cy="246221"/>
+          </a:xfrm>
+          <a:prstGeom prst="rect">
+            <a:avLst/>
+          </a:prstGeom>
+          <a:noFill/>
+        </p:spPr>
+        <p:txBody>
+          <a:bodyPr wrap="square" rtlCol="0">
+            <a:spAutoFit/>
+          </a:bodyPr>
+          <a:lstStyle/>
+          <a:p>
+            <a:pPr algn="ctr"/>
+            <a:r>
+              <a:rPr lang="en-US" sz="1000" b="1" dirty="0" smtClean="0">
+                <a:solidFill>
+                  <a:srgbClr val="FF0000"/>
+                </a:solidFill>
+                <a:latin typeface="Arial"/>
+                <a:cs typeface="Arial"/>
+              </a:rPr>
+              <a:t>113</a:t>
+            </a:r>
+            <a:endParaRPr lang="en-US" sz="1000" b="1" dirty="0">
+              <a:solidFill>
+                <a:srgbClr val="FF0000"/>
+              </a:solidFill>
+              <a:latin typeface="Arial"/>
+              <a:cs typeface="Arial"/>
+            </a:endParaRPr>
+          </a:p>
+        </p:txBody>
+      </p:sp>
+      <p:sp>
+        <p:nvSpPr>
+          <p:cNvPr id="59" name="TextBox 58"/>
+          <p:cNvSpPr txBox="1"/>
+          <p:nvPr/>
+        </p:nvSpPr>
+        <p:spPr>
+          <a:xfrm>
+            <a:off x="3745911" y="3246939"/>
+            <a:ext cx="460535" cy="246221"/>
+          </a:xfrm>
+          <a:prstGeom prst="rect">
+            <a:avLst/>
+          </a:prstGeom>
+          <a:noFill/>
+        </p:spPr>
+        <p:txBody>
+          <a:bodyPr wrap="square" rtlCol="0">
+            <a:spAutoFit/>
+          </a:bodyPr>
+          <a:lstStyle/>
+          <a:p>
+            <a:pPr algn="ctr"/>
+            <a:r>
+              <a:rPr lang="en-US" sz="1000" b="1" dirty="0" smtClean="0">
+                <a:solidFill>
+                  <a:srgbClr val="FF0000"/>
+                </a:solidFill>
+                <a:latin typeface="Arial"/>
+                <a:cs typeface="Arial"/>
+              </a:rPr>
+              <a:t>113</a:t>
+            </a:r>
+            <a:endParaRPr lang="en-US" sz="1000" b="1" dirty="0">
+              <a:solidFill>
+                <a:srgbClr val="FF0000"/>
+              </a:solidFill>
+              <a:latin typeface="Arial"/>
+              <a:cs typeface="Arial"/>
+            </a:endParaRPr>
+          </a:p>
+        </p:txBody>
+      </p:sp>
+      <p:sp>
+        <p:nvSpPr>
+          <p:cNvPr id="60" name="TextBox 59"/>
+          <p:cNvSpPr txBox="1"/>
+          <p:nvPr/>
+        </p:nvSpPr>
+        <p:spPr>
+          <a:xfrm>
+            <a:off x="4931227" y="3353460"/>
+            <a:ext cx="460535" cy="246221"/>
+          </a:xfrm>
+          <a:prstGeom prst="rect">
+            <a:avLst/>
+          </a:prstGeom>
+          <a:noFill/>
+        </p:spPr>
+        <p:txBody>
+          <a:bodyPr wrap="square" rtlCol="0">
+            <a:spAutoFit/>
+          </a:bodyPr>
+          <a:lstStyle/>
+          <a:p>
+            <a:pPr algn="ctr"/>
+            <a:r>
+              <a:rPr lang="en-US" sz="1000" b="1" dirty="0" smtClean="0">
+                <a:solidFill>
+                  <a:srgbClr val="FF0000"/>
+                </a:solidFill>
+                <a:latin typeface="Arial"/>
+                <a:cs typeface="Arial"/>
+              </a:rPr>
+              <a:t>75</a:t>
+            </a:r>
+            <a:endParaRPr lang="en-US" sz="1000" b="1" dirty="0">
+              <a:solidFill>
+                <a:srgbClr val="FF0000"/>
+              </a:solidFill>
+              <a:latin typeface="Arial"/>
+              <a:cs typeface="Arial"/>
+            </a:endParaRPr>
+          </a:p>
+        </p:txBody>
+      </p:sp>
+      <p:sp>
+        <p:nvSpPr>
+          <p:cNvPr id="61" name="TextBox 60"/>
+          <p:cNvSpPr txBox="1"/>
+          <p:nvPr/>
+        </p:nvSpPr>
+        <p:spPr>
+          <a:xfrm>
+            <a:off x="2265618" y="3352691"/>
+            <a:ext cx="460535" cy="246221"/>
+          </a:xfrm>
+          <a:prstGeom prst="rect">
+            <a:avLst/>
+          </a:prstGeom>
+          <a:noFill/>
+        </p:spPr>
+        <p:txBody>
+          <a:bodyPr wrap="square" rtlCol="0">
+            <a:spAutoFit/>
+          </a:bodyPr>
+          <a:lstStyle/>
+          <a:p>
+            <a:pPr algn="ctr"/>
+            <a:r>
+              <a:rPr lang="en-US" sz="1000" b="1" dirty="0" smtClean="0">
+                <a:solidFill>
+                  <a:srgbClr val="FF0000"/>
+                </a:solidFill>
+                <a:latin typeface="Arial"/>
+                <a:cs typeface="Arial"/>
+              </a:rPr>
+              <a:t>75</a:t>
+            </a:r>
+            <a:endParaRPr lang="en-US" sz="1000" b="1" dirty="0">
+              <a:solidFill>
+                <a:srgbClr val="FF0000"/>
+              </a:solidFill>
+              <a:latin typeface="Arial"/>
+              <a:cs typeface="Arial"/>
+            </a:endParaRPr>
+          </a:p>
+        </p:txBody>
+      </p:sp>
+      <p:sp>
+        <p:nvSpPr>
+          <p:cNvPr id="62" name="TextBox 61"/>
+          <p:cNvSpPr txBox="1"/>
+          <p:nvPr/>
+        </p:nvSpPr>
+        <p:spPr>
+          <a:xfrm>
+            <a:off x="1496593" y="2289080"/>
+            <a:ext cx="460535" cy="246221"/>
+          </a:xfrm>
+          <a:prstGeom prst="rect">
+            <a:avLst/>
+          </a:prstGeom>
+          <a:noFill/>
+        </p:spPr>
+        <p:txBody>
+          <a:bodyPr wrap="square" rtlCol="0">
+            <a:spAutoFit/>
+          </a:bodyPr>
+          <a:lstStyle/>
+          <a:p>
+            <a:pPr algn="ctr"/>
+            <a:r>
+              <a:rPr lang="en-US" sz="1000" b="1" dirty="0" smtClean="0">
+                <a:solidFill>
+                  <a:srgbClr val="FF0000"/>
+                </a:solidFill>
+                <a:latin typeface="Arial"/>
+                <a:cs typeface="Arial"/>
+              </a:rPr>
+              <a:t>118</a:t>
+            </a:r>
+            <a:endParaRPr lang="en-US" sz="1000" b="1" dirty="0">
+              <a:solidFill>
+                <a:srgbClr val="FF0000"/>
+              </a:solidFill>
+              <a:latin typeface="Arial"/>
+              <a:cs typeface="Arial"/>
+            </a:endParaRPr>
+          </a:p>
+        </p:txBody>
+      </p:sp>
+      <p:sp>
+        <p:nvSpPr>
+          <p:cNvPr id="63" name="TextBox 62"/>
+          <p:cNvSpPr txBox="1"/>
+          <p:nvPr/>
+        </p:nvSpPr>
+        <p:spPr>
+          <a:xfrm>
+            <a:off x="3285261" y="2504491"/>
+            <a:ext cx="460535" cy="246221"/>
+          </a:xfrm>
+          <a:prstGeom prst="rect">
+            <a:avLst/>
+          </a:prstGeom>
+          <a:noFill/>
+        </p:spPr>
+        <p:txBody>
+          <a:bodyPr wrap="square" rtlCol="0">
+            <a:spAutoFit/>
+          </a:bodyPr>
+          <a:lstStyle/>
+          <a:p>
+            <a:pPr algn="ctr"/>
+            <a:r>
+              <a:rPr lang="en-US" sz="1000" b="1" dirty="0" smtClean="0">
+                <a:solidFill>
+                  <a:srgbClr val="FF0000"/>
+                </a:solidFill>
+                <a:latin typeface="Arial"/>
+                <a:cs typeface="Arial"/>
+              </a:rPr>
+              <a:t>118</a:t>
+            </a:r>
+            <a:endParaRPr lang="en-US" sz="1000" b="1" dirty="0">
+              <a:solidFill>
+                <a:srgbClr val="FF0000"/>
+              </a:solidFill>
+              <a:latin typeface="Arial"/>
+              <a:cs typeface="Arial"/>
+            </a:endParaRPr>
+          </a:p>
+        </p:txBody>
+      </p:sp>
+      <p:sp>
+        <p:nvSpPr>
+          <p:cNvPr id="64" name="TextBox 63"/>
+          <p:cNvSpPr txBox="1"/>
+          <p:nvPr/>
+        </p:nvSpPr>
+        <p:spPr>
+          <a:xfrm>
+            <a:off x="1207556" y="666839"/>
+            <a:ext cx="406946" cy="246221"/>
+          </a:xfrm>
+          <a:prstGeom prst="rect">
+            <a:avLst/>
+          </a:prstGeom>
+          <a:noFill/>
+        </p:spPr>
+        <p:txBody>
+          <a:bodyPr wrap="square" rtlCol="0">
+            <a:spAutoFit/>
+          </a:bodyPr>
+          <a:lstStyle/>
+          <a:p>
+            <a:pPr algn="ctr"/>
+            <a:r>
+              <a:rPr lang="en-US" sz="1000" b="1" dirty="0" smtClean="0">
+                <a:solidFill>
+                  <a:srgbClr val="FF6600"/>
+                </a:solidFill>
+                <a:latin typeface="Arial"/>
+                <a:cs typeface="Arial"/>
+              </a:rPr>
+              <a:t>309</a:t>
             </a:r>
             <a:endParaRPr lang="en-US" sz="1000" b="1" dirty="0">
               <a:solidFill>
@@ -4304,1382 +4804,78 @@
           </a:p>
         </p:txBody>
       </p:sp>
-      <p:sp>
-        <p:nvSpPr>
-          <p:cNvPr id="32" name="TextBox 31"/>
-          <p:cNvSpPr txBox="1"/>
+      <p:cxnSp>
+        <p:nvCxnSpPr>
+          <p:cNvPr id="3" name="Straight Connector 2"/>
+          <p:cNvCxnSpPr/>
           <p:nvPr/>
-        </p:nvSpPr>
-        <p:spPr>
-          <a:xfrm>
-            <a:off x="4747926" y="4196864"/>
-            <a:ext cx="438583" cy="246221"/>
-          </a:xfrm>
-          <a:prstGeom prst="rect">
+        </p:nvCxnSpPr>
+        <p:spPr>
+          <a:xfrm flipV="1">
+            <a:off x="850901" y="666839"/>
+            <a:ext cx="0" cy="763895"/>
+          </a:xfrm>
+          <a:prstGeom prst="line">
             <a:avLst/>
           </a:prstGeom>
-          <a:noFill/>
-        </p:spPr>
-        <p:txBody>
-          <a:bodyPr wrap="square" rtlCol="0">
-            <a:spAutoFit/>
-          </a:bodyPr>
-          <a:lstStyle/>
-          <a:p>
-            <a:pPr algn="ctr"/>
-            <a:r>
-              <a:rPr lang="en-US" sz="1000" b="1" dirty="0" smtClean="0">
-                <a:solidFill>
-                  <a:srgbClr val="FF0000"/>
-                </a:solidFill>
-                <a:latin typeface="Arial"/>
-                <a:cs typeface="Arial"/>
-              </a:rPr>
-              <a:t>583</a:t>
-            </a:r>
-            <a:endParaRPr lang="en-US" sz="1000" b="1" dirty="0">
-              <a:solidFill>
-                <a:srgbClr val="FF0000"/>
-              </a:solidFill>
-              <a:latin typeface="Arial"/>
-              <a:cs typeface="Arial"/>
-            </a:endParaRPr>
-          </a:p>
-        </p:txBody>
-      </p:sp>
-      <p:sp>
-        <p:nvSpPr>
-          <p:cNvPr id="33" name="TextBox 32"/>
-          <p:cNvSpPr txBox="1"/>
+          <a:ln>
+            <a:solidFill>
+              <a:srgbClr val="7F7F7F"/>
+            </a:solidFill>
+            <a:prstDash val="sysDash"/>
+          </a:ln>
+        </p:spPr>
+        <p:style>
+          <a:lnRef idx="1">
+            <a:schemeClr val="dk1"/>
+          </a:lnRef>
+          <a:fillRef idx="0">
+            <a:schemeClr val="dk1"/>
+          </a:fillRef>
+          <a:effectRef idx="0">
+            <a:schemeClr val="dk1"/>
+          </a:effectRef>
+          <a:fontRef idx="minor">
+            <a:schemeClr val="tx1"/>
+          </a:fontRef>
+        </p:style>
+      </p:cxnSp>
+      <p:cxnSp>
+        <p:nvCxnSpPr>
+          <p:cNvPr id="65" name="Straight Connector 64"/>
+          <p:cNvCxnSpPr/>
           <p:nvPr/>
-        </p:nvSpPr>
-        <p:spPr>
-          <a:xfrm>
-            <a:off x="4618699" y="4781476"/>
-            <a:ext cx="434025" cy="246221"/>
-          </a:xfrm>
-          <a:prstGeom prst="rect">
+        </p:nvCxnSpPr>
+        <p:spPr>
+          <a:xfrm>
+            <a:off x="626535" y="296544"/>
+            <a:ext cx="228599" cy="370295"/>
+          </a:xfrm>
+          <a:prstGeom prst="line">
             <a:avLst/>
           </a:prstGeom>
-          <a:noFill/>
-        </p:spPr>
-        <p:txBody>
-          <a:bodyPr wrap="square" rtlCol="0">
-            <a:spAutoFit/>
-          </a:bodyPr>
-          <a:lstStyle/>
-          <a:p>
-            <a:pPr algn="ctr"/>
-            <a:r>
-              <a:rPr lang="en-US" sz="1000" b="1" dirty="0" smtClean="0">
-                <a:solidFill>
-                  <a:srgbClr val="FF0000"/>
-                </a:solidFill>
-                <a:latin typeface="Arial"/>
-                <a:cs typeface="Arial"/>
-              </a:rPr>
-              <a:t>587</a:t>
-            </a:r>
-            <a:endParaRPr lang="en-US" sz="1000" b="1" dirty="0">
-              <a:solidFill>
-                <a:srgbClr val="FF0000"/>
-              </a:solidFill>
-              <a:latin typeface="Arial"/>
-              <a:cs typeface="Arial"/>
-            </a:endParaRPr>
-          </a:p>
-        </p:txBody>
-      </p:sp>
-      <p:sp>
-        <p:nvSpPr>
-          <p:cNvPr id="34" name="TextBox 33"/>
-          <p:cNvSpPr txBox="1"/>
-          <p:nvPr/>
-        </p:nvSpPr>
-        <p:spPr>
-          <a:xfrm>
-            <a:off x="5042030" y="4213798"/>
-            <a:ext cx="406946" cy="246221"/>
-          </a:xfrm>
-          <a:prstGeom prst="rect">
-            <a:avLst/>
-          </a:prstGeom>
-          <a:noFill/>
-        </p:spPr>
-        <p:txBody>
-          <a:bodyPr wrap="square" rtlCol="0">
-            <a:spAutoFit/>
-          </a:bodyPr>
-          <a:lstStyle/>
-          <a:p>
-            <a:pPr algn="ctr"/>
-            <a:r>
-              <a:rPr lang="en-US" sz="1000" b="1" dirty="0" smtClean="0">
-                <a:solidFill>
-                  <a:srgbClr val="FF0000"/>
-                </a:solidFill>
-                <a:latin typeface="Arial"/>
-                <a:cs typeface="Arial"/>
-              </a:rPr>
-              <a:t>582</a:t>
-            </a:r>
-            <a:endParaRPr lang="en-US" sz="1000" b="1" dirty="0">
-              <a:solidFill>
-                <a:srgbClr val="FF0000"/>
-              </a:solidFill>
-              <a:latin typeface="Arial"/>
-              <a:cs typeface="Arial"/>
-            </a:endParaRPr>
-          </a:p>
-        </p:txBody>
-      </p:sp>
-      <p:sp>
-        <p:nvSpPr>
-          <p:cNvPr id="35" name="TextBox 34"/>
-          <p:cNvSpPr txBox="1"/>
-          <p:nvPr/>
-        </p:nvSpPr>
-        <p:spPr>
-          <a:xfrm>
-            <a:off x="4830923" y="4981881"/>
-            <a:ext cx="460535" cy="246221"/>
-          </a:xfrm>
-          <a:prstGeom prst="rect">
-            <a:avLst/>
-          </a:prstGeom>
-          <a:noFill/>
-        </p:spPr>
-        <p:txBody>
-          <a:bodyPr wrap="square" rtlCol="0">
-            <a:spAutoFit/>
-          </a:bodyPr>
-          <a:lstStyle/>
-          <a:p>
-            <a:pPr algn="ctr"/>
-            <a:r>
-              <a:rPr lang="en-US" sz="1000" b="1" dirty="0" smtClean="0">
-                <a:solidFill>
-                  <a:srgbClr val="D99449"/>
-                </a:solidFill>
-                <a:latin typeface="Arial"/>
-                <a:cs typeface="Arial"/>
-              </a:rPr>
-              <a:t>588</a:t>
-            </a:r>
-            <a:endParaRPr lang="en-US" sz="1000" b="1" dirty="0">
-              <a:solidFill>
-                <a:srgbClr val="D99449"/>
-              </a:solidFill>
-              <a:latin typeface="Arial"/>
-              <a:cs typeface="Arial"/>
-            </a:endParaRPr>
-          </a:p>
-        </p:txBody>
-      </p:sp>
-      <p:sp>
-        <p:nvSpPr>
-          <p:cNvPr id="36" name="TextBox 35"/>
-          <p:cNvSpPr txBox="1"/>
-          <p:nvPr/>
-        </p:nvSpPr>
-        <p:spPr>
-          <a:xfrm>
-            <a:off x="797548" y="311181"/>
-            <a:ext cx="406946" cy="246221"/>
-          </a:xfrm>
-          <a:prstGeom prst="rect">
-            <a:avLst/>
-          </a:prstGeom>
-          <a:noFill/>
-        </p:spPr>
-        <p:txBody>
-          <a:bodyPr wrap="square" rtlCol="0">
-            <a:spAutoFit/>
-          </a:bodyPr>
-          <a:lstStyle/>
-          <a:p>
-            <a:pPr algn="ctr"/>
-            <a:r>
-              <a:rPr lang="en-US" sz="1000" b="1" dirty="0" smtClean="0">
-                <a:solidFill>
-                  <a:srgbClr val="FF6600"/>
-                </a:solidFill>
-                <a:latin typeface="Arial"/>
-                <a:cs typeface="Arial"/>
-              </a:rPr>
-              <a:t>165</a:t>
-            </a:r>
-            <a:endParaRPr lang="en-US" sz="1000" b="1" dirty="0">
-              <a:solidFill>
-                <a:srgbClr val="FF6600"/>
-              </a:solidFill>
-              <a:latin typeface="Arial"/>
-              <a:cs typeface="Arial"/>
-            </a:endParaRPr>
-          </a:p>
-        </p:txBody>
-      </p:sp>
-      <p:sp>
-        <p:nvSpPr>
-          <p:cNvPr id="37" name="TextBox 36"/>
-          <p:cNvSpPr txBox="1"/>
-          <p:nvPr/>
-        </p:nvSpPr>
-        <p:spPr>
-          <a:xfrm>
-            <a:off x="931063" y="615274"/>
-            <a:ext cx="406946" cy="246221"/>
-          </a:xfrm>
-          <a:prstGeom prst="rect">
-            <a:avLst/>
-          </a:prstGeom>
-          <a:noFill/>
-        </p:spPr>
-        <p:txBody>
-          <a:bodyPr wrap="square" rtlCol="0">
-            <a:spAutoFit/>
-          </a:bodyPr>
-          <a:lstStyle/>
-          <a:p>
-            <a:pPr algn="ctr"/>
-            <a:r>
-              <a:rPr lang="en-US" sz="1000" b="1" dirty="0" smtClean="0">
-                <a:solidFill>
-                  <a:srgbClr val="FF6600"/>
-                </a:solidFill>
-                <a:latin typeface="Arial"/>
-                <a:cs typeface="Arial"/>
-              </a:rPr>
-              <a:t>164</a:t>
-            </a:r>
-            <a:endParaRPr lang="en-US" sz="1000" b="1" dirty="0">
-              <a:solidFill>
-                <a:srgbClr val="FF6600"/>
-              </a:solidFill>
-              <a:latin typeface="Arial"/>
-              <a:cs typeface="Arial"/>
-            </a:endParaRPr>
-          </a:p>
-        </p:txBody>
-      </p:sp>
-      <p:sp>
-        <p:nvSpPr>
-          <p:cNvPr id="38" name="TextBox 37"/>
-          <p:cNvSpPr txBox="1"/>
-          <p:nvPr/>
-        </p:nvSpPr>
-        <p:spPr>
-          <a:xfrm>
-            <a:off x="1544538" y="907718"/>
-            <a:ext cx="406946" cy="246221"/>
-          </a:xfrm>
-          <a:prstGeom prst="rect">
-            <a:avLst/>
-          </a:prstGeom>
-          <a:noFill/>
-        </p:spPr>
-        <p:txBody>
-          <a:bodyPr wrap="square" rtlCol="0">
-            <a:spAutoFit/>
-          </a:bodyPr>
-          <a:lstStyle/>
-          <a:p>
-            <a:pPr algn="ctr"/>
-            <a:r>
-              <a:rPr lang="en-US" sz="1000" b="1" dirty="0" smtClean="0">
-                <a:solidFill>
-                  <a:srgbClr val="FF6600"/>
-                </a:solidFill>
-                <a:latin typeface="Arial"/>
-                <a:cs typeface="Arial"/>
-              </a:rPr>
-              <a:t>307</a:t>
-            </a:r>
-            <a:endParaRPr lang="en-US" sz="1000" b="1" dirty="0">
-              <a:solidFill>
-                <a:srgbClr val="FF6600"/>
-              </a:solidFill>
-              <a:latin typeface="Arial"/>
-              <a:cs typeface="Arial"/>
-            </a:endParaRPr>
-          </a:p>
-        </p:txBody>
-      </p:sp>
-      <p:sp>
-        <p:nvSpPr>
-          <p:cNvPr id="40" name="TextBox 39"/>
-          <p:cNvSpPr txBox="1"/>
-          <p:nvPr/>
-        </p:nvSpPr>
-        <p:spPr>
-          <a:xfrm>
-            <a:off x="797548" y="1142179"/>
-            <a:ext cx="460535" cy="246221"/>
-          </a:xfrm>
-          <a:prstGeom prst="rect">
-            <a:avLst/>
-          </a:prstGeom>
-          <a:noFill/>
-        </p:spPr>
-        <p:txBody>
-          <a:bodyPr wrap="square" rtlCol="0">
-            <a:spAutoFit/>
-          </a:bodyPr>
-          <a:lstStyle/>
-          <a:p>
-            <a:pPr algn="ctr"/>
-            <a:r>
-              <a:rPr lang="en-US" sz="1000" b="1" dirty="0" smtClean="0">
-                <a:solidFill>
-                  <a:srgbClr val="D99449"/>
-                </a:solidFill>
-                <a:latin typeface="Arial"/>
-                <a:cs typeface="Arial"/>
-              </a:rPr>
-              <a:t>308</a:t>
-            </a:r>
-            <a:endParaRPr lang="en-US" sz="1000" b="1" dirty="0">
-              <a:solidFill>
-                <a:srgbClr val="D99449"/>
-              </a:solidFill>
-              <a:latin typeface="Arial"/>
-              <a:cs typeface="Arial"/>
-            </a:endParaRPr>
-          </a:p>
-        </p:txBody>
-      </p:sp>
-      <p:sp>
-        <p:nvSpPr>
-          <p:cNvPr id="41" name="TextBox 40"/>
-          <p:cNvSpPr txBox="1"/>
-          <p:nvPr/>
-        </p:nvSpPr>
-        <p:spPr>
-          <a:xfrm>
-            <a:off x="1179093" y="492163"/>
-            <a:ext cx="460535" cy="246221"/>
-          </a:xfrm>
-          <a:prstGeom prst="rect">
-            <a:avLst/>
-          </a:prstGeom>
-          <a:noFill/>
-        </p:spPr>
-        <p:txBody>
-          <a:bodyPr wrap="square" rtlCol="0">
-            <a:spAutoFit/>
-          </a:bodyPr>
-          <a:lstStyle/>
-          <a:p>
-            <a:pPr algn="ctr"/>
-            <a:r>
-              <a:rPr lang="en-US" sz="1000" b="1" dirty="0" smtClean="0">
-                <a:solidFill>
-                  <a:srgbClr val="D99449"/>
-                </a:solidFill>
-                <a:latin typeface="Arial"/>
-                <a:cs typeface="Arial"/>
-              </a:rPr>
-              <a:t>161</a:t>
-            </a:r>
-            <a:endParaRPr lang="en-US" sz="1000" b="1" dirty="0">
-              <a:solidFill>
-                <a:srgbClr val="D99449"/>
-              </a:solidFill>
-              <a:latin typeface="Arial"/>
-              <a:cs typeface="Arial"/>
-            </a:endParaRPr>
-          </a:p>
-        </p:txBody>
-      </p:sp>
-      <p:sp>
-        <p:nvSpPr>
-          <p:cNvPr id="42" name="TextBox 41"/>
-          <p:cNvSpPr txBox="1"/>
-          <p:nvPr/>
-        </p:nvSpPr>
-        <p:spPr>
-          <a:xfrm>
-            <a:off x="4426207" y="3192250"/>
-            <a:ext cx="460535" cy="246221"/>
-          </a:xfrm>
-          <a:prstGeom prst="rect">
-            <a:avLst/>
-          </a:prstGeom>
-          <a:noFill/>
-        </p:spPr>
-        <p:txBody>
-          <a:bodyPr wrap="square" rtlCol="0">
-            <a:spAutoFit/>
-          </a:bodyPr>
-          <a:lstStyle/>
-          <a:p>
-            <a:pPr algn="ctr"/>
-            <a:r>
-              <a:rPr lang="en-US" sz="1000" b="1" dirty="0" smtClean="0">
-                <a:solidFill>
-                  <a:srgbClr val="660066"/>
-                </a:solidFill>
-                <a:latin typeface="Arial"/>
-                <a:cs typeface="Arial"/>
-              </a:rPr>
-              <a:t>69</a:t>
-            </a:r>
-            <a:endParaRPr lang="en-US" sz="1000" b="1" dirty="0">
-              <a:solidFill>
-                <a:srgbClr val="660066"/>
-              </a:solidFill>
-              <a:latin typeface="Arial"/>
-              <a:cs typeface="Arial"/>
-            </a:endParaRPr>
-          </a:p>
-        </p:txBody>
-      </p:sp>
-      <p:sp>
-        <p:nvSpPr>
-          <p:cNvPr id="43" name="TextBox 42"/>
-          <p:cNvSpPr txBox="1"/>
-          <p:nvPr/>
-        </p:nvSpPr>
-        <p:spPr>
-          <a:xfrm>
-            <a:off x="1691906" y="2574184"/>
-            <a:ext cx="460535" cy="246221"/>
-          </a:xfrm>
-          <a:prstGeom prst="rect">
-            <a:avLst/>
-          </a:prstGeom>
-          <a:noFill/>
-        </p:spPr>
-        <p:txBody>
-          <a:bodyPr wrap="square" rtlCol="0">
-            <a:spAutoFit/>
-          </a:bodyPr>
-          <a:lstStyle/>
-          <a:p>
-            <a:pPr algn="ctr"/>
-            <a:r>
-              <a:rPr lang="en-US" sz="1000" b="1" dirty="0" smtClean="0">
-                <a:solidFill>
-                  <a:srgbClr val="660066"/>
-                </a:solidFill>
-                <a:latin typeface="Arial"/>
-                <a:cs typeface="Arial"/>
-              </a:rPr>
-              <a:t>69</a:t>
-            </a:r>
-            <a:endParaRPr lang="en-US" sz="1000" b="1" dirty="0">
-              <a:solidFill>
-                <a:srgbClr val="660066"/>
-              </a:solidFill>
-              <a:latin typeface="Arial"/>
-              <a:cs typeface="Arial"/>
-            </a:endParaRPr>
-          </a:p>
-        </p:txBody>
-      </p:sp>
-      <p:sp>
-        <p:nvSpPr>
-          <p:cNvPr id="44" name="TextBox 43"/>
-          <p:cNvSpPr txBox="1"/>
-          <p:nvPr/>
-        </p:nvSpPr>
-        <p:spPr>
-          <a:xfrm>
-            <a:off x="2581514" y="2004759"/>
-            <a:ext cx="460535" cy="246221"/>
-          </a:xfrm>
-          <a:prstGeom prst="rect">
-            <a:avLst/>
-          </a:prstGeom>
-          <a:noFill/>
-        </p:spPr>
-        <p:txBody>
-          <a:bodyPr wrap="square" rtlCol="0">
-            <a:spAutoFit/>
-          </a:bodyPr>
-          <a:lstStyle/>
-          <a:p>
-            <a:pPr algn="ctr"/>
-            <a:r>
-              <a:rPr lang="en-US" sz="1000" b="1" dirty="0" smtClean="0">
-                <a:solidFill>
-                  <a:srgbClr val="FF0000"/>
-                </a:solidFill>
-                <a:latin typeface="Arial"/>
-                <a:cs typeface="Arial"/>
-              </a:rPr>
-              <a:t>64</a:t>
-            </a:r>
-            <a:endParaRPr lang="en-US" sz="1000" b="1" dirty="0">
-              <a:solidFill>
-                <a:srgbClr val="FF0000"/>
-              </a:solidFill>
-              <a:latin typeface="Arial"/>
-              <a:cs typeface="Arial"/>
-            </a:endParaRPr>
-          </a:p>
-        </p:txBody>
-      </p:sp>
-      <p:sp>
-        <p:nvSpPr>
-          <p:cNvPr id="45" name="TextBox 44"/>
-          <p:cNvSpPr txBox="1"/>
-          <p:nvPr/>
-        </p:nvSpPr>
-        <p:spPr>
-          <a:xfrm>
-            <a:off x="4382186" y="2169520"/>
-            <a:ext cx="460535" cy="246221"/>
-          </a:xfrm>
-          <a:prstGeom prst="rect">
-            <a:avLst/>
-          </a:prstGeom>
-          <a:noFill/>
-        </p:spPr>
-        <p:txBody>
-          <a:bodyPr wrap="square" rtlCol="0">
-            <a:spAutoFit/>
-          </a:bodyPr>
-          <a:lstStyle/>
-          <a:p>
-            <a:pPr algn="ctr"/>
-            <a:r>
-              <a:rPr lang="en-US" sz="1000" b="1" dirty="0" smtClean="0">
-                <a:solidFill>
-                  <a:srgbClr val="FF0000"/>
-                </a:solidFill>
-                <a:latin typeface="Arial"/>
-                <a:cs typeface="Arial"/>
-              </a:rPr>
-              <a:t>64</a:t>
-            </a:r>
-            <a:endParaRPr lang="en-US" sz="1000" b="1" dirty="0">
-              <a:solidFill>
-                <a:srgbClr val="FF0000"/>
-              </a:solidFill>
-              <a:latin typeface="Arial"/>
-              <a:cs typeface="Arial"/>
-            </a:endParaRPr>
-          </a:p>
-        </p:txBody>
-      </p:sp>
-      <p:sp>
-        <p:nvSpPr>
-          <p:cNvPr id="46" name="TextBox 45"/>
-          <p:cNvSpPr txBox="1"/>
-          <p:nvPr/>
-        </p:nvSpPr>
-        <p:spPr>
-          <a:xfrm>
-            <a:off x="617247" y="1855561"/>
-            <a:ext cx="460535" cy="246221"/>
-          </a:xfrm>
-          <a:prstGeom prst="rect">
-            <a:avLst/>
-          </a:prstGeom>
-          <a:noFill/>
-        </p:spPr>
-        <p:txBody>
-          <a:bodyPr wrap="square" rtlCol="0">
-            <a:spAutoFit/>
-          </a:bodyPr>
-          <a:lstStyle/>
-          <a:p>
-            <a:pPr algn="ctr"/>
-            <a:r>
-              <a:rPr lang="en-US" sz="1000" b="1" dirty="0" smtClean="0">
-                <a:solidFill>
-                  <a:srgbClr val="0000FF"/>
-                </a:solidFill>
-                <a:latin typeface="Arial"/>
-                <a:cs typeface="Arial"/>
-              </a:rPr>
-              <a:t>435</a:t>
-            </a:r>
-            <a:endParaRPr lang="en-US" sz="1000" b="1" dirty="0">
-              <a:solidFill>
-                <a:srgbClr val="0000FF"/>
-              </a:solidFill>
-              <a:latin typeface="Arial"/>
-              <a:cs typeface="Arial"/>
-            </a:endParaRPr>
-          </a:p>
-        </p:txBody>
-      </p:sp>
-      <p:sp>
-        <p:nvSpPr>
-          <p:cNvPr id="47" name="TextBox 46"/>
-          <p:cNvSpPr txBox="1"/>
-          <p:nvPr/>
-        </p:nvSpPr>
-        <p:spPr>
-          <a:xfrm>
-            <a:off x="3577526" y="2165282"/>
-            <a:ext cx="460535" cy="246221"/>
-          </a:xfrm>
-          <a:prstGeom prst="rect">
-            <a:avLst/>
-          </a:prstGeom>
-          <a:noFill/>
-        </p:spPr>
-        <p:txBody>
-          <a:bodyPr wrap="square" rtlCol="0">
-            <a:spAutoFit/>
-          </a:bodyPr>
-          <a:lstStyle/>
-          <a:p>
-            <a:pPr algn="ctr"/>
-            <a:r>
-              <a:rPr lang="en-US" sz="1000" b="1" dirty="0" smtClean="0">
-                <a:solidFill>
-                  <a:srgbClr val="0000FF"/>
-                </a:solidFill>
-                <a:latin typeface="Arial"/>
-                <a:cs typeface="Arial"/>
-              </a:rPr>
-              <a:t>435</a:t>
-            </a:r>
-            <a:endParaRPr lang="en-US" sz="1000" b="1" dirty="0">
-              <a:solidFill>
-                <a:srgbClr val="0000FF"/>
-              </a:solidFill>
-              <a:latin typeface="Arial"/>
-              <a:cs typeface="Arial"/>
-            </a:endParaRPr>
-          </a:p>
-        </p:txBody>
-      </p:sp>
-      <p:sp>
-        <p:nvSpPr>
-          <p:cNvPr id="48" name="TextBox 47"/>
-          <p:cNvSpPr txBox="1"/>
-          <p:nvPr/>
-        </p:nvSpPr>
-        <p:spPr>
-          <a:xfrm>
-            <a:off x="903943" y="2464114"/>
-            <a:ext cx="406946" cy="246221"/>
-          </a:xfrm>
-          <a:prstGeom prst="rect">
-            <a:avLst/>
-          </a:prstGeom>
-          <a:noFill/>
-        </p:spPr>
-        <p:txBody>
-          <a:bodyPr wrap="square" rtlCol="0">
-            <a:spAutoFit/>
-          </a:bodyPr>
-          <a:lstStyle/>
-          <a:p>
-            <a:pPr algn="ctr"/>
-            <a:r>
-              <a:rPr lang="en-US" sz="1000" b="1" dirty="0" smtClean="0">
-                <a:solidFill>
-                  <a:srgbClr val="FF6600"/>
-                </a:solidFill>
-                <a:latin typeface="Arial"/>
-                <a:cs typeface="Arial"/>
-              </a:rPr>
-              <a:t>434</a:t>
-            </a:r>
-            <a:endParaRPr lang="en-US" sz="1000" b="1" dirty="0">
-              <a:solidFill>
-                <a:srgbClr val="FF6600"/>
-              </a:solidFill>
-              <a:latin typeface="Arial"/>
-              <a:cs typeface="Arial"/>
-            </a:endParaRPr>
-          </a:p>
-        </p:txBody>
-      </p:sp>
-      <p:sp>
-        <p:nvSpPr>
-          <p:cNvPr id="49" name="TextBox 48"/>
-          <p:cNvSpPr txBox="1"/>
-          <p:nvPr/>
-        </p:nvSpPr>
-        <p:spPr>
-          <a:xfrm>
-            <a:off x="2999239" y="2013910"/>
-            <a:ext cx="406946" cy="246221"/>
-          </a:xfrm>
-          <a:prstGeom prst="rect">
-            <a:avLst/>
-          </a:prstGeom>
-          <a:noFill/>
-        </p:spPr>
-        <p:txBody>
-          <a:bodyPr wrap="square" rtlCol="0">
-            <a:spAutoFit/>
-          </a:bodyPr>
-          <a:lstStyle/>
-          <a:p>
-            <a:pPr algn="ctr"/>
-            <a:r>
-              <a:rPr lang="en-US" sz="1000" b="1" dirty="0" smtClean="0">
-                <a:solidFill>
-                  <a:srgbClr val="FF6600"/>
-                </a:solidFill>
-                <a:latin typeface="Arial"/>
-                <a:cs typeface="Arial"/>
-              </a:rPr>
-              <a:t>434</a:t>
-            </a:r>
-            <a:endParaRPr lang="en-US" sz="1000" b="1" dirty="0">
-              <a:solidFill>
-                <a:srgbClr val="FF6600"/>
-              </a:solidFill>
-              <a:latin typeface="Arial"/>
-              <a:cs typeface="Arial"/>
-            </a:endParaRPr>
-          </a:p>
-        </p:txBody>
-      </p:sp>
-      <p:sp>
-        <p:nvSpPr>
-          <p:cNvPr id="50" name="TextBox 49"/>
-          <p:cNvSpPr txBox="1"/>
-          <p:nvPr/>
-        </p:nvSpPr>
-        <p:spPr>
-          <a:xfrm>
-            <a:off x="5050607" y="2895111"/>
-            <a:ext cx="460535" cy="246221"/>
-          </a:xfrm>
-          <a:prstGeom prst="rect">
-            <a:avLst/>
-          </a:prstGeom>
-          <a:noFill/>
-        </p:spPr>
-        <p:txBody>
-          <a:bodyPr wrap="square" rtlCol="0">
-            <a:spAutoFit/>
-          </a:bodyPr>
-          <a:lstStyle/>
-          <a:p>
-            <a:pPr algn="ctr"/>
-            <a:r>
-              <a:rPr lang="en-US" sz="1000" b="1" dirty="0" smtClean="0">
-                <a:solidFill>
-                  <a:srgbClr val="0000FF"/>
-                </a:solidFill>
-                <a:latin typeface="Arial"/>
-                <a:cs typeface="Arial"/>
-              </a:rPr>
-              <a:t>72</a:t>
-            </a:r>
-            <a:endParaRPr lang="en-US" sz="1000" b="1" dirty="0">
-              <a:solidFill>
-                <a:srgbClr val="0000FF"/>
-              </a:solidFill>
-              <a:latin typeface="Arial"/>
-              <a:cs typeface="Arial"/>
-            </a:endParaRPr>
-          </a:p>
-        </p:txBody>
-      </p:sp>
-      <p:sp>
-        <p:nvSpPr>
-          <p:cNvPr id="51" name="TextBox 50"/>
-          <p:cNvSpPr txBox="1"/>
-          <p:nvPr/>
-        </p:nvSpPr>
-        <p:spPr>
-          <a:xfrm>
-            <a:off x="2153333" y="2615221"/>
-            <a:ext cx="460535" cy="246221"/>
-          </a:xfrm>
-          <a:prstGeom prst="rect">
-            <a:avLst/>
-          </a:prstGeom>
-          <a:noFill/>
-        </p:spPr>
-        <p:txBody>
-          <a:bodyPr wrap="square" rtlCol="0">
-            <a:spAutoFit/>
-          </a:bodyPr>
-          <a:lstStyle/>
-          <a:p>
-            <a:pPr algn="ctr"/>
-            <a:r>
-              <a:rPr lang="en-US" sz="1000" b="1" dirty="0" smtClean="0">
-                <a:solidFill>
-                  <a:srgbClr val="0000FF"/>
-                </a:solidFill>
-                <a:latin typeface="Arial"/>
-                <a:cs typeface="Arial"/>
-              </a:rPr>
-              <a:t>72</a:t>
-            </a:r>
-            <a:endParaRPr lang="en-US" sz="1000" b="1" dirty="0">
-              <a:solidFill>
-                <a:srgbClr val="0000FF"/>
-              </a:solidFill>
-              <a:latin typeface="Arial"/>
-              <a:cs typeface="Arial"/>
-            </a:endParaRPr>
-          </a:p>
-        </p:txBody>
-      </p:sp>
-      <p:sp>
-        <p:nvSpPr>
-          <p:cNvPr id="52" name="TextBox 51"/>
-          <p:cNvSpPr txBox="1"/>
-          <p:nvPr/>
-        </p:nvSpPr>
-        <p:spPr>
-          <a:xfrm>
-            <a:off x="1021465" y="2168362"/>
-            <a:ext cx="460535" cy="246221"/>
-          </a:xfrm>
-          <a:prstGeom prst="rect">
-            <a:avLst/>
-          </a:prstGeom>
-          <a:noFill/>
-        </p:spPr>
-        <p:txBody>
-          <a:bodyPr wrap="square" rtlCol="0">
-            <a:spAutoFit/>
-          </a:bodyPr>
-          <a:lstStyle/>
-          <a:p>
-            <a:pPr algn="ctr"/>
-            <a:r>
-              <a:rPr lang="en-US" sz="1000" b="1" dirty="0" smtClean="0">
-                <a:solidFill>
-                  <a:srgbClr val="FF0000"/>
-                </a:solidFill>
-                <a:latin typeface="Arial"/>
-                <a:cs typeface="Arial"/>
-              </a:rPr>
-              <a:t>436</a:t>
-            </a:r>
-            <a:endParaRPr lang="en-US" sz="1000" b="1" dirty="0">
-              <a:solidFill>
-                <a:srgbClr val="FF0000"/>
-              </a:solidFill>
-              <a:latin typeface="Arial"/>
-              <a:cs typeface="Arial"/>
-            </a:endParaRPr>
-          </a:p>
-        </p:txBody>
-      </p:sp>
-      <p:sp>
-        <p:nvSpPr>
-          <p:cNvPr id="53" name="TextBox 52"/>
-          <p:cNvSpPr txBox="1"/>
-          <p:nvPr/>
-        </p:nvSpPr>
-        <p:spPr>
-          <a:xfrm>
-            <a:off x="3310776" y="1951065"/>
-            <a:ext cx="460535" cy="246221"/>
-          </a:xfrm>
-          <a:prstGeom prst="rect">
-            <a:avLst/>
-          </a:prstGeom>
-          <a:noFill/>
-        </p:spPr>
-        <p:txBody>
-          <a:bodyPr wrap="square" rtlCol="0">
-            <a:spAutoFit/>
-          </a:bodyPr>
-          <a:lstStyle/>
-          <a:p>
-            <a:pPr algn="ctr"/>
-            <a:r>
-              <a:rPr lang="en-US" sz="1000" b="1" dirty="0" smtClean="0">
-                <a:solidFill>
-                  <a:srgbClr val="FF0000"/>
-                </a:solidFill>
-                <a:latin typeface="Arial"/>
-                <a:cs typeface="Arial"/>
-              </a:rPr>
-              <a:t>436</a:t>
-            </a:r>
-            <a:endParaRPr lang="en-US" sz="1000" b="1" dirty="0">
-              <a:solidFill>
-                <a:srgbClr val="FF0000"/>
-              </a:solidFill>
-              <a:latin typeface="Arial"/>
-              <a:cs typeface="Arial"/>
-            </a:endParaRPr>
-          </a:p>
-        </p:txBody>
-      </p:sp>
-      <p:sp>
-        <p:nvSpPr>
-          <p:cNvPr id="54" name="TextBox 53"/>
-          <p:cNvSpPr txBox="1"/>
-          <p:nvPr/>
-        </p:nvSpPr>
-        <p:spPr>
-          <a:xfrm>
-            <a:off x="1266217" y="1872404"/>
-            <a:ext cx="460535" cy="246221"/>
-          </a:xfrm>
-          <a:prstGeom prst="rect">
-            <a:avLst/>
-          </a:prstGeom>
-          <a:noFill/>
-        </p:spPr>
-        <p:txBody>
-          <a:bodyPr wrap="square" rtlCol="0">
-            <a:spAutoFit/>
-          </a:bodyPr>
-          <a:lstStyle/>
-          <a:p>
-            <a:pPr algn="ctr"/>
-            <a:r>
-              <a:rPr lang="en-US" sz="1000" b="1" dirty="0" smtClean="0">
-                <a:solidFill>
-                  <a:srgbClr val="FF0000"/>
-                </a:solidFill>
-                <a:latin typeface="Arial"/>
-                <a:cs typeface="Arial"/>
-              </a:rPr>
-              <a:t>381</a:t>
-            </a:r>
-            <a:endParaRPr lang="en-US" sz="1000" b="1" dirty="0">
-              <a:solidFill>
-                <a:srgbClr val="FF0000"/>
-              </a:solidFill>
-              <a:latin typeface="Arial"/>
-              <a:cs typeface="Arial"/>
-            </a:endParaRPr>
-          </a:p>
-        </p:txBody>
-      </p:sp>
-      <p:sp>
-        <p:nvSpPr>
-          <p:cNvPr id="55" name="TextBox 54"/>
-          <p:cNvSpPr txBox="1"/>
-          <p:nvPr/>
-        </p:nvSpPr>
-        <p:spPr>
-          <a:xfrm>
-            <a:off x="3902172" y="1789854"/>
-            <a:ext cx="460535" cy="246221"/>
-          </a:xfrm>
-          <a:prstGeom prst="rect">
-            <a:avLst/>
-          </a:prstGeom>
-          <a:noFill/>
-        </p:spPr>
-        <p:txBody>
-          <a:bodyPr wrap="square" rtlCol="0">
-            <a:spAutoFit/>
-          </a:bodyPr>
-          <a:lstStyle/>
-          <a:p>
-            <a:pPr algn="ctr"/>
-            <a:r>
-              <a:rPr lang="en-US" sz="1000" b="1" dirty="0" smtClean="0">
-                <a:solidFill>
-                  <a:srgbClr val="FF0000"/>
-                </a:solidFill>
-                <a:latin typeface="Arial"/>
-                <a:cs typeface="Arial"/>
-              </a:rPr>
-              <a:t>381</a:t>
-            </a:r>
-            <a:endParaRPr lang="en-US" sz="1000" b="1" dirty="0">
-              <a:solidFill>
-                <a:srgbClr val="FF0000"/>
-              </a:solidFill>
-              <a:latin typeface="Arial"/>
-              <a:cs typeface="Arial"/>
-            </a:endParaRPr>
-          </a:p>
-        </p:txBody>
-      </p:sp>
-      <p:sp>
-        <p:nvSpPr>
-          <p:cNvPr id="56" name="TextBox 55"/>
-          <p:cNvSpPr txBox="1"/>
-          <p:nvPr/>
-        </p:nvSpPr>
-        <p:spPr>
-          <a:xfrm>
-            <a:off x="3245767" y="1698493"/>
-            <a:ext cx="460535" cy="246221"/>
-          </a:xfrm>
-          <a:prstGeom prst="rect">
-            <a:avLst/>
-          </a:prstGeom>
-          <a:noFill/>
-        </p:spPr>
-        <p:txBody>
-          <a:bodyPr wrap="square" rtlCol="0">
-            <a:spAutoFit/>
-          </a:bodyPr>
-          <a:lstStyle/>
-          <a:p>
-            <a:pPr algn="ctr"/>
-            <a:r>
-              <a:rPr lang="en-US" sz="1000" b="1" dirty="0" smtClean="0">
-                <a:solidFill>
-                  <a:srgbClr val="FF0000"/>
-                </a:solidFill>
-                <a:latin typeface="Arial"/>
-                <a:cs typeface="Arial"/>
-              </a:rPr>
-              <a:t>420</a:t>
-            </a:r>
-            <a:endParaRPr lang="en-US" sz="1000" b="1" dirty="0">
-              <a:solidFill>
-                <a:srgbClr val="FF0000"/>
-              </a:solidFill>
-              <a:latin typeface="Arial"/>
-              <a:cs typeface="Arial"/>
-            </a:endParaRPr>
-          </a:p>
-        </p:txBody>
-      </p:sp>
-      <p:sp>
-        <p:nvSpPr>
-          <p:cNvPr id="57" name="TextBox 56"/>
-          <p:cNvSpPr txBox="1"/>
-          <p:nvPr/>
-        </p:nvSpPr>
-        <p:spPr>
-          <a:xfrm rot="16200000">
-            <a:off x="991499" y="1767243"/>
-            <a:ext cx="460535" cy="246221"/>
-          </a:xfrm>
-          <a:prstGeom prst="rect">
-            <a:avLst/>
-          </a:prstGeom>
-          <a:noFill/>
-        </p:spPr>
-        <p:txBody>
-          <a:bodyPr wrap="square" rtlCol="0">
-            <a:spAutoFit/>
-          </a:bodyPr>
-          <a:lstStyle/>
-          <a:p>
-            <a:pPr algn="ctr"/>
-            <a:r>
-              <a:rPr lang="en-US" sz="1000" b="1" dirty="0" smtClean="0">
-                <a:solidFill>
-                  <a:srgbClr val="FF0000"/>
-                </a:solidFill>
-                <a:latin typeface="Arial"/>
-                <a:cs typeface="Arial"/>
-              </a:rPr>
-              <a:t>420</a:t>
-            </a:r>
-            <a:endParaRPr lang="en-US" sz="1000" b="1" dirty="0">
-              <a:solidFill>
-                <a:srgbClr val="FF0000"/>
-              </a:solidFill>
-              <a:latin typeface="Arial"/>
-              <a:cs typeface="Arial"/>
-            </a:endParaRPr>
-          </a:p>
-        </p:txBody>
-      </p:sp>
-      <p:sp>
-        <p:nvSpPr>
-          <p:cNvPr id="58" name="TextBox 57"/>
-          <p:cNvSpPr txBox="1"/>
-          <p:nvPr/>
-        </p:nvSpPr>
-        <p:spPr>
-          <a:xfrm>
-            <a:off x="1023915" y="3062789"/>
-            <a:ext cx="460535" cy="246221"/>
-          </a:xfrm>
-          <a:prstGeom prst="rect">
-            <a:avLst/>
-          </a:prstGeom>
-          <a:noFill/>
-        </p:spPr>
-        <p:txBody>
-          <a:bodyPr wrap="square" rtlCol="0">
-            <a:spAutoFit/>
-          </a:bodyPr>
-          <a:lstStyle/>
-          <a:p>
-            <a:pPr algn="ctr"/>
-            <a:r>
-              <a:rPr lang="en-US" sz="1000" b="1" dirty="0" smtClean="0">
-                <a:solidFill>
-                  <a:srgbClr val="FF0000"/>
-                </a:solidFill>
-                <a:latin typeface="Arial"/>
-                <a:cs typeface="Arial"/>
-              </a:rPr>
-              <a:t>113</a:t>
-            </a:r>
-            <a:endParaRPr lang="en-US" sz="1000" b="1" dirty="0">
-              <a:solidFill>
-                <a:srgbClr val="FF0000"/>
-              </a:solidFill>
-              <a:latin typeface="Arial"/>
-              <a:cs typeface="Arial"/>
-            </a:endParaRPr>
-          </a:p>
-        </p:txBody>
-      </p:sp>
-      <p:sp>
-        <p:nvSpPr>
-          <p:cNvPr id="59" name="TextBox 58"/>
-          <p:cNvSpPr txBox="1"/>
-          <p:nvPr/>
-        </p:nvSpPr>
-        <p:spPr>
-          <a:xfrm>
-            <a:off x="3745911" y="3246939"/>
-            <a:ext cx="460535" cy="246221"/>
-          </a:xfrm>
-          <a:prstGeom prst="rect">
-            <a:avLst/>
-          </a:prstGeom>
-          <a:noFill/>
-        </p:spPr>
-        <p:txBody>
-          <a:bodyPr wrap="square" rtlCol="0">
-            <a:spAutoFit/>
-          </a:bodyPr>
-          <a:lstStyle/>
-          <a:p>
-            <a:pPr algn="ctr"/>
-            <a:r>
-              <a:rPr lang="en-US" sz="1000" b="1" dirty="0" smtClean="0">
-                <a:solidFill>
-                  <a:srgbClr val="FF0000"/>
-                </a:solidFill>
-                <a:latin typeface="Arial"/>
-                <a:cs typeface="Arial"/>
-              </a:rPr>
-              <a:t>113</a:t>
-            </a:r>
-            <a:endParaRPr lang="en-US" sz="1000" b="1" dirty="0">
-              <a:solidFill>
-                <a:srgbClr val="FF0000"/>
-              </a:solidFill>
-              <a:latin typeface="Arial"/>
-              <a:cs typeface="Arial"/>
-            </a:endParaRPr>
-          </a:p>
-        </p:txBody>
-      </p:sp>
-      <p:sp>
-        <p:nvSpPr>
-          <p:cNvPr id="60" name="TextBox 59"/>
-          <p:cNvSpPr txBox="1"/>
-          <p:nvPr/>
-        </p:nvSpPr>
-        <p:spPr>
-          <a:xfrm>
-            <a:off x="4931227" y="3353460"/>
-            <a:ext cx="460535" cy="246221"/>
-          </a:xfrm>
-          <a:prstGeom prst="rect">
-            <a:avLst/>
-          </a:prstGeom>
-          <a:noFill/>
-        </p:spPr>
-        <p:txBody>
-          <a:bodyPr wrap="square" rtlCol="0">
-            <a:spAutoFit/>
-          </a:bodyPr>
-          <a:lstStyle/>
-          <a:p>
-            <a:pPr algn="ctr"/>
-            <a:r>
-              <a:rPr lang="en-US" sz="1000" b="1" dirty="0" smtClean="0">
-                <a:solidFill>
-                  <a:srgbClr val="FF0000"/>
-                </a:solidFill>
-                <a:latin typeface="Arial"/>
-                <a:cs typeface="Arial"/>
-              </a:rPr>
-              <a:t>75</a:t>
-            </a:r>
-            <a:endParaRPr lang="en-US" sz="1000" b="1" dirty="0">
-              <a:solidFill>
-                <a:srgbClr val="FF0000"/>
-              </a:solidFill>
-              <a:latin typeface="Arial"/>
-              <a:cs typeface="Arial"/>
-            </a:endParaRPr>
-          </a:p>
-        </p:txBody>
-      </p:sp>
-      <p:sp>
-        <p:nvSpPr>
-          <p:cNvPr id="61" name="TextBox 60"/>
-          <p:cNvSpPr txBox="1"/>
-          <p:nvPr/>
-        </p:nvSpPr>
-        <p:spPr>
-          <a:xfrm>
-            <a:off x="2265618" y="3352691"/>
-            <a:ext cx="460535" cy="246221"/>
-          </a:xfrm>
-          <a:prstGeom prst="rect">
-            <a:avLst/>
-          </a:prstGeom>
-          <a:noFill/>
-        </p:spPr>
-        <p:txBody>
-          <a:bodyPr wrap="square" rtlCol="0">
-            <a:spAutoFit/>
-          </a:bodyPr>
-          <a:lstStyle/>
-          <a:p>
-            <a:pPr algn="ctr"/>
-            <a:r>
-              <a:rPr lang="en-US" sz="1000" b="1" dirty="0" smtClean="0">
-                <a:solidFill>
-                  <a:srgbClr val="FF0000"/>
-                </a:solidFill>
-                <a:latin typeface="Arial"/>
-                <a:cs typeface="Arial"/>
-              </a:rPr>
-              <a:t>75</a:t>
-            </a:r>
-            <a:endParaRPr lang="en-US" sz="1000" b="1" dirty="0">
-              <a:solidFill>
-                <a:srgbClr val="FF0000"/>
-              </a:solidFill>
-              <a:latin typeface="Arial"/>
-              <a:cs typeface="Arial"/>
-            </a:endParaRPr>
-          </a:p>
-        </p:txBody>
-      </p:sp>
-      <p:sp>
-        <p:nvSpPr>
-          <p:cNvPr id="62" name="TextBox 61"/>
-          <p:cNvSpPr txBox="1"/>
-          <p:nvPr/>
-        </p:nvSpPr>
-        <p:spPr>
-          <a:xfrm>
-            <a:off x="1496593" y="2289080"/>
-            <a:ext cx="460535" cy="246221"/>
-          </a:xfrm>
-          <a:prstGeom prst="rect">
-            <a:avLst/>
-          </a:prstGeom>
-          <a:noFill/>
-        </p:spPr>
-        <p:txBody>
-          <a:bodyPr wrap="square" rtlCol="0">
-            <a:spAutoFit/>
-          </a:bodyPr>
-          <a:lstStyle/>
-          <a:p>
-            <a:pPr algn="ctr"/>
-            <a:r>
-              <a:rPr lang="en-US" sz="1000" b="1" dirty="0" smtClean="0">
-                <a:solidFill>
-                  <a:srgbClr val="FF0000"/>
-                </a:solidFill>
-                <a:latin typeface="Arial"/>
-                <a:cs typeface="Arial"/>
-              </a:rPr>
-              <a:t>118</a:t>
-            </a:r>
-            <a:endParaRPr lang="en-US" sz="1000" b="1" dirty="0">
-              <a:solidFill>
-                <a:srgbClr val="FF0000"/>
-              </a:solidFill>
-              <a:latin typeface="Arial"/>
-              <a:cs typeface="Arial"/>
-            </a:endParaRPr>
-          </a:p>
-        </p:txBody>
-      </p:sp>
-      <p:sp>
-        <p:nvSpPr>
-          <p:cNvPr id="63" name="TextBox 62"/>
-          <p:cNvSpPr txBox="1"/>
-          <p:nvPr/>
-        </p:nvSpPr>
-        <p:spPr>
-          <a:xfrm>
-            <a:off x="3285261" y="2504491"/>
-            <a:ext cx="460535" cy="246221"/>
-          </a:xfrm>
-          <a:prstGeom prst="rect">
-            <a:avLst/>
-          </a:prstGeom>
-          <a:noFill/>
-        </p:spPr>
-        <p:txBody>
-          <a:bodyPr wrap="square" rtlCol="0">
-            <a:spAutoFit/>
-          </a:bodyPr>
-          <a:lstStyle/>
-          <a:p>
-            <a:pPr algn="ctr"/>
-            <a:r>
-              <a:rPr lang="en-US" sz="1000" b="1" dirty="0" smtClean="0">
-                <a:solidFill>
-                  <a:srgbClr val="FF0000"/>
-                </a:solidFill>
-                <a:latin typeface="Arial"/>
-                <a:cs typeface="Arial"/>
-              </a:rPr>
-              <a:t>118</a:t>
-            </a:r>
-            <a:endParaRPr lang="en-US" sz="1000" b="1" dirty="0">
-              <a:solidFill>
-                <a:srgbClr val="FF0000"/>
-              </a:solidFill>
-              <a:latin typeface="Arial"/>
-              <a:cs typeface="Arial"/>
-            </a:endParaRPr>
-          </a:p>
-        </p:txBody>
-      </p:sp>
-      <p:sp>
-        <p:nvSpPr>
-          <p:cNvPr id="64" name="TextBox 63"/>
-          <p:cNvSpPr txBox="1"/>
-          <p:nvPr/>
-        </p:nvSpPr>
-        <p:spPr>
-          <a:xfrm>
-            <a:off x="1207556" y="666839"/>
-            <a:ext cx="406946" cy="246221"/>
-          </a:xfrm>
-          <a:prstGeom prst="rect">
-            <a:avLst/>
-          </a:prstGeom>
-          <a:noFill/>
-        </p:spPr>
-        <p:txBody>
-          <a:bodyPr wrap="square" rtlCol="0">
-            <a:spAutoFit/>
-          </a:bodyPr>
-          <a:lstStyle/>
-          <a:p>
-            <a:pPr algn="ctr"/>
-            <a:r>
-              <a:rPr lang="en-US" sz="1000" b="1" dirty="0" smtClean="0">
-                <a:solidFill>
-                  <a:srgbClr val="FF6600"/>
-                </a:solidFill>
-                <a:latin typeface="Arial"/>
-                <a:cs typeface="Arial"/>
-              </a:rPr>
-              <a:t>309</a:t>
-            </a:r>
-            <a:endParaRPr lang="en-US" sz="1000" b="1" dirty="0">
-              <a:solidFill>
-                <a:srgbClr val="FF6600"/>
-              </a:solidFill>
-              <a:latin typeface="Arial"/>
-              <a:cs typeface="Arial"/>
-            </a:endParaRPr>
-          </a:p>
-        </p:txBody>
-      </p:sp>
+          <a:ln>
+            <a:solidFill>
+              <a:srgbClr val="7F7F7F"/>
+            </a:solidFill>
+            <a:prstDash val="sysDash"/>
+          </a:ln>
+        </p:spPr>
+        <p:style>
+          <a:lnRef idx="1">
+            <a:schemeClr val="dk1"/>
+          </a:lnRef>
+          <a:fillRef idx="0">
+            <a:schemeClr val="dk1"/>
+          </a:fillRef>
+          <a:effectRef idx="0">
+            <a:schemeClr val="dk1"/>
+          </a:effectRef>
+          <a:fontRef idx="minor">
+            <a:schemeClr val="tx1"/>
+          </a:fontRef>
+        </p:style>
+      </p:cxnSp>
     </p:spTree>
     <p:extLst>
       <p:ext uri="{BB962C8B-B14F-4D97-AF65-F5344CB8AC3E}">

</xml_diff>